<commit_message>
Added some more paragraphs on global games setup.
</commit_message>
<xml_diff>
--- a/figures/GlobalGameSetup.pptx
+++ b/figures/GlobalGameSetup.pptx
@@ -104,6 +104,11 @@
       </a:defRPr>
     </a:lvl9pPr>
   </p:defaultTextStyle>
+  <p:extLst>
+    <p:ext uri="{EFAFB233-063F-42B5-8137-9DF3F51BA10A}">
+      <p15:sldGuideLst xmlns:p15="http://schemas.microsoft.com/office/powerpoint/2012/main"/>
+    </p:ext>
+  </p:extLst>
 </p:presentation>
 </file>
 
@@ -238,7 +243,7 @@
           <a:p>
             <a:fld id="{9BF37CAF-DAD9-447A-84B9-D54918012BD3}" type="datetimeFigureOut">
               <a:rPr lang="en-US" smtClean="0"/>
-              <a:t>1/9/2015</a:t>
+              <a:t>1/14/2015</a:t>
             </a:fld>
             <a:endParaRPr lang="en-US"/>
           </a:p>
@@ -408,7 +413,7 @@
           <a:p>
             <a:fld id="{9BF37CAF-DAD9-447A-84B9-D54918012BD3}" type="datetimeFigureOut">
               <a:rPr lang="en-US" smtClean="0"/>
-              <a:t>1/9/2015</a:t>
+              <a:t>1/14/2015</a:t>
             </a:fld>
             <a:endParaRPr lang="en-US"/>
           </a:p>
@@ -588,7 +593,7 @@
           <a:p>
             <a:fld id="{9BF37CAF-DAD9-447A-84B9-D54918012BD3}" type="datetimeFigureOut">
               <a:rPr lang="en-US" smtClean="0"/>
-              <a:t>1/9/2015</a:t>
+              <a:t>1/14/2015</a:t>
             </a:fld>
             <a:endParaRPr lang="en-US"/>
           </a:p>
@@ -758,7 +763,7 @@
           <a:p>
             <a:fld id="{9BF37CAF-DAD9-447A-84B9-D54918012BD3}" type="datetimeFigureOut">
               <a:rPr lang="en-US" smtClean="0"/>
-              <a:t>1/9/2015</a:t>
+              <a:t>1/14/2015</a:t>
             </a:fld>
             <a:endParaRPr lang="en-US"/>
           </a:p>
@@ -1004,7 +1009,7 @@
           <a:p>
             <a:fld id="{9BF37CAF-DAD9-447A-84B9-D54918012BD3}" type="datetimeFigureOut">
               <a:rPr lang="en-US" smtClean="0"/>
-              <a:t>1/9/2015</a:t>
+              <a:t>1/14/2015</a:t>
             </a:fld>
             <a:endParaRPr lang="en-US"/>
           </a:p>
@@ -1236,7 +1241,7 @@
           <a:p>
             <a:fld id="{9BF37CAF-DAD9-447A-84B9-D54918012BD3}" type="datetimeFigureOut">
               <a:rPr lang="en-US" smtClean="0"/>
-              <a:t>1/9/2015</a:t>
+              <a:t>1/14/2015</a:t>
             </a:fld>
             <a:endParaRPr lang="en-US"/>
           </a:p>
@@ -1603,7 +1608,7 @@
           <a:p>
             <a:fld id="{9BF37CAF-DAD9-447A-84B9-D54918012BD3}" type="datetimeFigureOut">
               <a:rPr lang="en-US" smtClean="0"/>
-              <a:t>1/9/2015</a:t>
+              <a:t>1/14/2015</a:t>
             </a:fld>
             <a:endParaRPr lang="en-US"/>
           </a:p>
@@ -1721,7 +1726,7 @@
           <a:p>
             <a:fld id="{9BF37CAF-DAD9-447A-84B9-D54918012BD3}" type="datetimeFigureOut">
               <a:rPr lang="en-US" smtClean="0"/>
-              <a:t>1/9/2015</a:t>
+              <a:t>1/14/2015</a:t>
             </a:fld>
             <a:endParaRPr lang="en-US"/>
           </a:p>
@@ -1816,7 +1821,7 @@
           <a:p>
             <a:fld id="{9BF37CAF-DAD9-447A-84B9-D54918012BD3}" type="datetimeFigureOut">
               <a:rPr lang="en-US" smtClean="0"/>
-              <a:t>1/9/2015</a:t>
+              <a:t>1/14/2015</a:t>
             </a:fld>
             <a:endParaRPr lang="en-US"/>
           </a:p>
@@ -2093,7 +2098,7 @@
           <a:p>
             <a:fld id="{9BF37CAF-DAD9-447A-84B9-D54918012BD3}" type="datetimeFigureOut">
               <a:rPr lang="en-US" smtClean="0"/>
-              <a:t>1/9/2015</a:t>
+              <a:t>1/14/2015</a:t>
             </a:fld>
             <a:endParaRPr lang="en-US"/>
           </a:p>
@@ -2346,7 +2351,7 @@
           <a:p>
             <a:fld id="{9BF37CAF-DAD9-447A-84B9-D54918012BD3}" type="datetimeFigureOut">
               <a:rPr lang="en-US" smtClean="0"/>
-              <a:t>1/9/2015</a:t>
+              <a:t>1/14/2015</a:t>
             </a:fld>
             <a:endParaRPr lang="en-US"/>
           </a:p>
@@ -2559,7 +2564,7 @@
           <a:p>
             <a:fld id="{9BF37CAF-DAD9-447A-84B9-D54918012BD3}" type="datetimeFigureOut">
               <a:rPr lang="en-US" smtClean="0"/>
-              <a:t>1/9/2015</a:t>
+              <a:t>1/14/2015</a:t>
             </a:fld>
             <a:endParaRPr lang="en-US"/>
           </a:p>
@@ -2964,8 +2969,8 @@
           <a:chExt cx="0" cy="0"/>
         </a:xfrm>
       </p:grpSpPr>
-      <mc:AlternateContent xmlns:mc="http://schemas.openxmlformats.org/markup-compatibility/2006">
-        <mc:Choice xmlns:a14="http://schemas.microsoft.com/office/drawing/2010/main" Requires="a14">
+      <mc:AlternateContent xmlns:mc="http://schemas.openxmlformats.org/markup-compatibility/2006" xmlns:a14="http://schemas.microsoft.com/office/drawing/2010/main">
+        <mc:Choice Requires="a14">
           <p:sp>
             <p:nvSpPr>
               <p:cNvPr id="5" name="Oval 4"/>
@@ -3047,7 +3052,7 @@
             </p:txBody>
           </p:sp>
         </mc:Choice>
-        <mc:Fallback>
+        <mc:Fallback xmlns="">
           <p:sp>
             <p:nvSpPr>
               <p:cNvPr id="5" name="Oval 4"/>
@@ -3111,6 +3116,8 @@
             <a:solidFill>
               <a:schemeClr val="bg1"/>
             </a:solidFill>
+            <a:prstDash val="dash"/>
+            <a:headEnd type="triangle"/>
           </a:ln>
         </p:spPr>
         <p:style>
@@ -3148,6 +3155,8 @@
             <a:solidFill>
               <a:schemeClr val="bg1"/>
             </a:solidFill>
+            <a:prstDash val="dash"/>
+            <a:headEnd type="triangle"/>
           </a:ln>
         </p:spPr>
         <p:style>
@@ -3185,6 +3194,8 @@
             <a:solidFill>
               <a:schemeClr val="bg1"/>
             </a:solidFill>
+            <a:prstDash val="dash"/>
+            <a:headEnd type="triangle"/>
           </a:ln>
         </p:spPr>
         <p:style>
@@ -3212,8 +3223,8 @@
             </p:nvSpPr>
             <p:spPr>
               <a:xfrm>
-                <a:off x="3590970" y="4060310"/>
-                <a:ext cx="639854" cy="369332"/>
+                <a:off x="3686402" y="4071784"/>
+                <a:ext cx="466090" cy="369332"/>
               </a:xfrm>
               <a:prstGeom prst="rect">
                 <a:avLst/>
@@ -3226,18 +3237,13 @@
               </a:bodyPr>
               <a:lstStyle/>
               <a:p>
+                <a:pPr/>
                 <a14:m>
                   <m:oMathPara xmlns:m="http://schemas.openxmlformats.org/officeDocument/2006/math">
                     <m:oMathParaPr>
                       <m:jc m:val="centerGroup"/>
                     </m:oMathParaPr>
                     <m:oMath xmlns:m="http://schemas.openxmlformats.org/officeDocument/2006/math">
-                      <m:r>
-                        <a:rPr lang="en-US" b="0" i="1" smtClean="0">
-                          <a:latin typeface="Cambria Math" panose="02040503050406030204" pitchFamily="18" charset="0"/>
-                        </a:rPr>
-                        <m:t>+</m:t>
-                      </m:r>
                       <m:sSub>
                         <m:sSubPr>
                           <m:ctrlPr>
@@ -3251,7 +3257,7 @@
                             <a:rPr lang="en-US" b="0" i="1" smtClean="0">
                               <a:latin typeface="Cambria Math" panose="02040503050406030204" pitchFamily="18" charset="0"/>
                             </a:rPr>
-                            <m:t>𝜂</m:t>
+                            <m:t>𝑥</m:t>
                           </m:r>
                         </m:e>
                         <m:sub>
@@ -3282,8 +3288,8 @@
             </p:nvSpPr>
             <p:spPr>
               <a:xfrm>
-                <a:off x="3590970" y="4060310"/>
-                <a:ext cx="639854" cy="369332"/>
+                <a:off x="3686402" y="4071784"/>
+                <a:ext cx="466090" cy="369332"/>
               </a:xfrm>
               <a:prstGeom prst="rect">
                 <a:avLst/>
@@ -3291,7 +3297,7 @@
               <a:blipFill rotWithShape="0">
                 <a:blip r:embed="rId3"/>
                 <a:stretch>
-                  <a:fillRect b="-6557"/>
+                  <a:fillRect/>
                 </a:stretch>
               </a:blipFill>
             </p:spPr>
@@ -3320,8 +3326,8 @@
             </p:nvSpPr>
             <p:spPr>
               <a:xfrm>
-                <a:off x="4185105" y="1928433"/>
-                <a:ext cx="639854" cy="369332"/>
+                <a:off x="3153708" y="2155015"/>
+                <a:ext cx="576312" cy="338554"/>
               </a:xfrm>
               <a:prstGeom prst="rect">
                 <a:avLst/>
@@ -3334,6 +3340,7 @@
               </a:bodyPr>
               <a:lstStyle/>
               <a:p>
+                <a:pPr/>
                 <a14:m>
                   <m:oMathPara xmlns:m="http://schemas.openxmlformats.org/officeDocument/2006/math">
                     <m:oMathParaPr>
@@ -3341,7 +3348,10 @@
                     </m:oMathParaPr>
                     <m:oMath xmlns:m="http://schemas.openxmlformats.org/officeDocument/2006/math">
                       <m:r>
-                        <a:rPr lang="en-US" b="0" i="1" smtClean="0">
+                        <a:rPr lang="en-US" sz="1600" b="0" i="1" smtClean="0">
+                          <a:solidFill>
+                            <a:schemeClr val="bg1"/>
+                          </a:solidFill>
                           <a:latin typeface="Cambria Math" panose="02040503050406030204" pitchFamily="18" charset="0"/>
                         </a:rPr>
                         <m:t>+</m:t>
@@ -3349,22 +3359,31 @@
                       <m:sSub>
                         <m:sSubPr>
                           <m:ctrlPr>
-                            <a:rPr lang="en-US" b="0" i="1" smtClean="0">
+                            <a:rPr lang="en-US" sz="1600" b="0" i="1" smtClean="0">
+                              <a:solidFill>
+                                <a:schemeClr val="bg1"/>
+                              </a:solidFill>
                               <a:latin typeface="Cambria Math" panose="02040503050406030204" pitchFamily="18" charset="0"/>
                             </a:rPr>
                           </m:ctrlPr>
                         </m:sSubPr>
                         <m:e>
                           <m:r>
-                            <a:rPr lang="en-US" b="0" i="1" smtClean="0">
+                            <a:rPr lang="en-US" sz="1600" i="1">
+                              <a:solidFill>
+                                <a:schemeClr val="bg1"/>
+                              </a:solidFill>
                               <a:latin typeface="Cambria Math" panose="02040503050406030204" pitchFamily="18" charset="0"/>
                             </a:rPr>
-                            <m:t>𝜂</m:t>
+                            <m:t>𝜖</m:t>
                           </m:r>
                         </m:e>
                         <m:sub>
                           <m:r>
-                            <a:rPr lang="en-US" b="0" i="1" smtClean="0">
+                            <a:rPr lang="en-US" sz="1600" b="0" i="1" smtClean="0">
+                              <a:solidFill>
+                                <a:schemeClr val="bg1"/>
+                              </a:solidFill>
                               <a:latin typeface="Cambria Math" panose="02040503050406030204" pitchFamily="18" charset="0"/>
                             </a:rPr>
                             <m:t>2</m:t>
@@ -3374,7 +3393,11 @@
                     </m:oMath>
                   </m:oMathPara>
                 </a14:m>
-                <a:endParaRPr lang="en-US" b="0" dirty="0" smtClean="0"/>
+                <a:endParaRPr lang="en-US" sz="1600" b="0" dirty="0" smtClean="0">
+                  <a:solidFill>
+                    <a:schemeClr val="bg1"/>
+                  </a:solidFill>
+                </a:endParaRPr>
               </a:p>
             </p:txBody>
           </p:sp>
@@ -3390,8 +3413,8 @@
             </p:nvSpPr>
             <p:spPr>
               <a:xfrm>
-                <a:off x="4185105" y="1928433"/>
-                <a:ext cx="639854" cy="369332"/>
+                <a:off x="3153708" y="2155015"/>
+                <a:ext cx="576312" cy="338554"/>
               </a:xfrm>
               <a:prstGeom prst="rect">
                 <a:avLst/>
@@ -3399,7 +3422,7 @@
               <a:blipFill rotWithShape="0">
                 <a:blip r:embed="rId4"/>
                 <a:stretch>
-                  <a:fillRect b="-6557"/>
+                  <a:fillRect/>
                 </a:stretch>
               </a:blipFill>
             </p:spPr>
@@ -3428,8 +3451,8 @@
             </p:nvSpPr>
             <p:spPr>
               <a:xfrm>
-                <a:off x="3576563" y="542409"/>
-                <a:ext cx="634533" cy="369332"/>
+                <a:off x="3206081" y="562174"/>
+                <a:ext cx="1383840" cy="369332"/>
               </a:xfrm>
               <a:prstGeom prst="rect">
                 <a:avLst/>
@@ -3442,12 +3465,50 @@
               </a:bodyPr>
               <a:lstStyle/>
               <a:p>
+                <a:pPr/>
                 <a14:m>
                   <m:oMathPara xmlns:m="http://schemas.openxmlformats.org/officeDocument/2006/math">
                     <m:oMathParaPr>
                       <m:jc m:val="centerGroup"/>
                     </m:oMathParaPr>
                     <m:oMath xmlns:m="http://schemas.openxmlformats.org/officeDocument/2006/math">
+                      <m:sSub>
+                        <m:sSubPr>
+                          <m:ctrlPr>
+                            <a:rPr lang="en-US" b="0" i="1" smtClean="0">
+                              <a:latin typeface="Cambria Math" panose="02040503050406030204" pitchFamily="18" charset="0"/>
+                            </a:rPr>
+                          </m:ctrlPr>
+                        </m:sSubPr>
+                        <m:e>
+                          <m:r>
+                            <a:rPr lang="en-US" b="0" i="1" smtClean="0">
+                              <a:latin typeface="Cambria Math" panose="02040503050406030204" pitchFamily="18" charset="0"/>
+                            </a:rPr>
+                            <m:t>𝑥</m:t>
+                          </m:r>
+                        </m:e>
+                        <m:sub>
+                          <m:r>
+                            <a:rPr lang="en-US" b="0" i="1" smtClean="0">
+                              <a:latin typeface="Cambria Math" panose="02040503050406030204" pitchFamily="18" charset="0"/>
+                            </a:rPr>
+                            <m:t>1</m:t>
+                          </m:r>
+                        </m:sub>
+                      </m:sSub>
+                      <m:r>
+                        <a:rPr lang="en-US" b="0" i="1" smtClean="0">
+                          <a:latin typeface="Cambria Math" panose="02040503050406030204" pitchFamily="18" charset="0"/>
+                        </a:rPr>
+                        <m:t>=</m:t>
+                      </m:r>
+                      <m:r>
+                        <a:rPr lang="en-US" b="0" i="1" smtClean="0">
+                          <a:latin typeface="Cambria Math" panose="02040503050406030204" pitchFamily="18" charset="0"/>
+                        </a:rPr>
+                        <m:t>𝜃</m:t>
+                      </m:r>
                       <m:r>
                         <a:rPr lang="en-US" b="0" i="1" smtClean="0">
                           <a:latin typeface="Cambria Math" panose="02040503050406030204" pitchFamily="18" charset="0"/>
@@ -3467,7 +3528,7 @@
                             <a:rPr lang="en-US" b="0" i="1" smtClean="0">
                               <a:latin typeface="Cambria Math" panose="02040503050406030204" pitchFamily="18" charset="0"/>
                             </a:rPr>
-                            <m:t>𝜂</m:t>
+                            <m:t>𝜖</m:t>
                           </m:r>
                         </m:e>
                         <m:sub>
@@ -3498,8 +3559,8 @@
             </p:nvSpPr>
             <p:spPr>
               <a:xfrm>
-                <a:off x="3576563" y="542409"/>
-                <a:ext cx="634533" cy="369332"/>
+                <a:off x="3206081" y="562174"/>
+                <a:ext cx="1383840" cy="369332"/>
               </a:xfrm>
               <a:prstGeom prst="rect">
                 <a:avLst/>
@@ -3507,7 +3568,7 @@
               <a:blipFill rotWithShape="0">
                 <a:blip r:embed="rId5"/>
                 <a:stretch>
-                  <a:fillRect b="-4918"/>
+                  <a:fillRect/>
                 </a:stretch>
               </a:blipFill>
             </p:spPr>
@@ -4018,6 +4079,359 @@
           </p:txBody>
         </p:sp>
       </p:grpSp>
+      <mc:AlternateContent xmlns:mc="http://schemas.openxmlformats.org/markup-compatibility/2006">
+        <mc:Choice xmlns:a14="http://schemas.microsoft.com/office/drawing/2010/main" Requires="a14">
+          <p:sp>
+            <p:nvSpPr>
+              <p:cNvPr id="30" name="TextBox 29"/>
+              <p:cNvSpPr txBox="1"/>
+              <p:nvPr/>
+            </p:nvSpPr>
+            <p:spPr>
+              <a:xfrm>
+                <a:off x="2720285" y="1365281"/>
+                <a:ext cx="571567" cy="338554"/>
+              </a:xfrm>
+              <a:prstGeom prst="rect">
+                <a:avLst/>
+              </a:prstGeom>
+              <a:noFill/>
+            </p:spPr>
+            <p:txBody>
+              <a:bodyPr wrap="none" rtlCol="0">
+                <a:spAutoFit/>
+              </a:bodyPr>
+              <a:lstStyle/>
+              <a:p>
+                <a:pPr/>
+                <a14:m>
+                  <m:oMathPara xmlns:m="http://schemas.openxmlformats.org/officeDocument/2006/math">
+                    <m:oMathParaPr>
+                      <m:jc m:val="centerGroup"/>
+                    </m:oMathParaPr>
+                    <m:oMath xmlns:m="http://schemas.openxmlformats.org/officeDocument/2006/math">
+                      <m:r>
+                        <a:rPr lang="en-US" sz="1600" b="0" i="1" smtClean="0">
+                          <a:solidFill>
+                            <a:schemeClr val="bg1"/>
+                          </a:solidFill>
+                          <a:latin typeface="Cambria Math" panose="02040503050406030204" pitchFamily="18" charset="0"/>
+                        </a:rPr>
+                        <m:t>+</m:t>
+                      </m:r>
+                      <m:sSub>
+                        <m:sSubPr>
+                          <m:ctrlPr>
+                            <a:rPr lang="en-US" sz="1600" b="0" i="1" smtClean="0">
+                              <a:solidFill>
+                                <a:schemeClr val="bg1"/>
+                              </a:solidFill>
+                              <a:latin typeface="Cambria Math" panose="02040503050406030204" pitchFamily="18" charset="0"/>
+                            </a:rPr>
+                          </m:ctrlPr>
+                        </m:sSubPr>
+                        <m:e>
+                          <m:r>
+                            <a:rPr lang="en-US" sz="1600" i="1">
+                              <a:solidFill>
+                                <a:schemeClr val="bg1"/>
+                              </a:solidFill>
+                              <a:latin typeface="Cambria Math" panose="02040503050406030204" pitchFamily="18" charset="0"/>
+                            </a:rPr>
+                            <m:t>𝜖</m:t>
+                          </m:r>
+                        </m:e>
+                        <m:sub>
+                          <m:r>
+                            <a:rPr lang="en-US" sz="1600" b="0" i="1" smtClean="0">
+                              <a:solidFill>
+                                <a:schemeClr val="bg1"/>
+                              </a:solidFill>
+                              <a:latin typeface="Cambria Math" panose="02040503050406030204" pitchFamily="18" charset="0"/>
+                            </a:rPr>
+                            <m:t>1</m:t>
+                          </m:r>
+                        </m:sub>
+                      </m:sSub>
+                    </m:oMath>
+                  </m:oMathPara>
+                </a14:m>
+                <a:endParaRPr lang="en-US" sz="1600" b="0" dirty="0" smtClean="0">
+                  <a:solidFill>
+                    <a:schemeClr val="bg1"/>
+                  </a:solidFill>
+                </a:endParaRPr>
+              </a:p>
+            </p:txBody>
+          </p:sp>
+        </mc:Choice>
+        <mc:Fallback>
+          <p:sp>
+            <p:nvSpPr>
+              <p:cNvPr id="30" name="TextBox 29"/>
+              <p:cNvSpPr txBox="1">
+                <a:spLocks noRot="1" noChangeAspect="1" noMove="1" noResize="1" noEditPoints="1" noAdjustHandles="1" noChangeArrowheads="1" noChangeShapeType="1" noTextEdit="1"/>
+              </p:cNvSpPr>
+              <p:nvPr/>
+            </p:nvSpPr>
+            <p:spPr>
+              <a:xfrm>
+                <a:off x="2720285" y="1365281"/>
+                <a:ext cx="571567" cy="338554"/>
+              </a:xfrm>
+              <a:prstGeom prst="rect">
+                <a:avLst/>
+              </a:prstGeom>
+              <a:blipFill rotWithShape="0">
+                <a:blip r:embed="rId6"/>
+                <a:stretch>
+                  <a:fillRect/>
+                </a:stretch>
+              </a:blipFill>
+            </p:spPr>
+            <p:txBody>
+              <a:bodyPr/>
+              <a:lstStyle/>
+              <a:p>
+                <a:r>
+                  <a:rPr lang="en-US">
+                    <a:noFill/>
+                  </a:rPr>
+                  <a:t> </a:t>
+                </a:r>
+              </a:p>
+            </p:txBody>
+          </p:sp>
+        </mc:Fallback>
+      </mc:AlternateContent>
+      <mc:AlternateContent xmlns:mc="http://schemas.openxmlformats.org/markup-compatibility/2006">
+        <mc:Choice xmlns:a14="http://schemas.microsoft.com/office/drawing/2010/main" Requires="a14">
+          <p:sp>
+            <p:nvSpPr>
+              <p:cNvPr id="31" name="TextBox 30"/>
+              <p:cNvSpPr txBox="1"/>
+              <p:nvPr/>
+            </p:nvSpPr>
+            <p:spPr>
+              <a:xfrm>
+                <a:off x="2629769" y="3099252"/>
+                <a:ext cx="576312" cy="338554"/>
+              </a:xfrm>
+              <a:prstGeom prst="rect">
+                <a:avLst/>
+              </a:prstGeom>
+              <a:noFill/>
+            </p:spPr>
+            <p:txBody>
+              <a:bodyPr wrap="none" rtlCol="0">
+                <a:spAutoFit/>
+              </a:bodyPr>
+              <a:lstStyle/>
+              <a:p>
+                <a:pPr/>
+                <a14:m>
+                  <m:oMathPara xmlns:m="http://schemas.openxmlformats.org/officeDocument/2006/math">
+                    <m:oMathParaPr>
+                      <m:jc m:val="centerGroup"/>
+                    </m:oMathParaPr>
+                    <m:oMath xmlns:m="http://schemas.openxmlformats.org/officeDocument/2006/math">
+                      <m:r>
+                        <a:rPr lang="en-US" sz="1600" b="0" i="1" smtClean="0">
+                          <a:solidFill>
+                            <a:schemeClr val="bg1"/>
+                          </a:solidFill>
+                          <a:latin typeface="Cambria Math" panose="02040503050406030204" pitchFamily="18" charset="0"/>
+                        </a:rPr>
+                        <m:t>+</m:t>
+                      </m:r>
+                      <m:sSub>
+                        <m:sSubPr>
+                          <m:ctrlPr>
+                            <a:rPr lang="en-US" sz="1600" b="0" i="1" smtClean="0">
+                              <a:solidFill>
+                                <a:schemeClr val="bg1"/>
+                              </a:solidFill>
+                              <a:latin typeface="Cambria Math" panose="02040503050406030204" pitchFamily="18" charset="0"/>
+                            </a:rPr>
+                          </m:ctrlPr>
+                        </m:sSubPr>
+                        <m:e>
+                          <m:r>
+                            <a:rPr lang="en-US" sz="1600" i="1">
+                              <a:solidFill>
+                                <a:schemeClr val="bg1"/>
+                              </a:solidFill>
+                              <a:latin typeface="Cambria Math" panose="02040503050406030204" pitchFamily="18" charset="0"/>
+                            </a:rPr>
+                            <m:t>𝜖</m:t>
+                          </m:r>
+                        </m:e>
+                        <m:sub>
+                          <m:r>
+                            <a:rPr lang="en-US" sz="1600" b="0" i="1" smtClean="0">
+                              <a:solidFill>
+                                <a:schemeClr val="bg1"/>
+                              </a:solidFill>
+                              <a:latin typeface="Cambria Math" panose="02040503050406030204" pitchFamily="18" charset="0"/>
+                            </a:rPr>
+                            <m:t>3</m:t>
+                          </m:r>
+                        </m:sub>
+                      </m:sSub>
+                    </m:oMath>
+                  </m:oMathPara>
+                </a14:m>
+                <a:endParaRPr lang="en-US" sz="1600" b="0" dirty="0" smtClean="0">
+                  <a:solidFill>
+                    <a:schemeClr val="bg1"/>
+                  </a:solidFill>
+                </a:endParaRPr>
+              </a:p>
+            </p:txBody>
+          </p:sp>
+        </mc:Choice>
+        <mc:Fallback>
+          <p:sp>
+            <p:nvSpPr>
+              <p:cNvPr id="31" name="TextBox 30"/>
+              <p:cNvSpPr txBox="1">
+                <a:spLocks noRot="1" noChangeAspect="1" noMove="1" noResize="1" noEditPoints="1" noAdjustHandles="1" noChangeArrowheads="1" noChangeShapeType="1" noTextEdit="1"/>
+              </p:cNvSpPr>
+              <p:nvPr/>
+            </p:nvSpPr>
+            <p:spPr>
+              <a:xfrm>
+                <a:off x="2629769" y="3099252"/>
+                <a:ext cx="576312" cy="338554"/>
+              </a:xfrm>
+              <a:prstGeom prst="rect">
+                <a:avLst/>
+              </a:prstGeom>
+              <a:blipFill rotWithShape="0">
+                <a:blip r:embed="rId7"/>
+                <a:stretch>
+                  <a:fillRect/>
+                </a:stretch>
+              </a:blipFill>
+            </p:spPr>
+            <p:txBody>
+              <a:bodyPr/>
+              <a:lstStyle/>
+              <a:p>
+                <a:r>
+                  <a:rPr lang="en-US">
+                    <a:noFill/>
+                  </a:rPr>
+                  <a:t> </a:t>
+                </a:r>
+              </a:p>
+            </p:txBody>
+          </p:sp>
+        </mc:Fallback>
+      </mc:AlternateContent>
+      <mc:AlternateContent xmlns:mc="http://schemas.openxmlformats.org/markup-compatibility/2006">
+        <mc:Choice xmlns:a14="http://schemas.microsoft.com/office/drawing/2010/main" Requires="a14">
+          <p:sp>
+            <p:nvSpPr>
+              <p:cNvPr id="32" name="TextBox 31"/>
+              <p:cNvSpPr txBox="1"/>
+              <p:nvPr/>
+            </p:nvSpPr>
+            <p:spPr>
+              <a:xfrm>
+                <a:off x="4315105" y="1942344"/>
+                <a:ext cx="466090" cy="369332"/>
+              </a:xfrm>
+              <a:prstGeom prst="rect">
+                <a:avLst/>
+              </a:prstGeom>
+              <a:noFill/>
+            </p:spPr>
+            <p:txBody>
+              <a:bodyPr wrap="none" rtlCol="0">
+                <a:spAutoFit/>
+              </a:bodyPr>
+              <a:lstStyle/>
+              <a:p>
+                <a:pPr/>
+                <a14:m>
+                  <m:oMathPara xmlns:m="http://schemas.openxmlformats.org/officeDocument/2006/math">
+                    <m:oMathParaPr>
+                      <m:jc m:val="centerGroup"/>
+                    </m:oMathParaPr>
+                    <m:oMath xmlns:m="http://schemas.openxmlformats.org/officeDocument/2006/math">
+                      <m:sSub>
+                        <m:sSubPr>
+                          <m:ctrlPr>
+                            <a:rPr lang="en-US" b="0" i="1" smtClean="0">
+                              <a:latin typeface="Cambria Math" panose="02040503050406030204" pitchFamily="18" charset="0"/>
+                            </a:rPr>
+                          </m:ctrlPr>
+                        </m:sSubPr>
+                        <m:e>
+                          <m:r>
+                            <a:rPr lang="en-US" b="0" i="1" smtClean="0">
+                              <a:latin typeface="Cambria Math" panose="02040503050406030204" pitchFamily="18" charset="0"/>
+                            </a:rPr>
+                            <m:t>𝑥</m:t>
+                          </m:r>
+                        </m:e>
+                        <m:sub>
+                          <m:r>
+                            <a:rPr lang="en-US" b="0" i="1" smtClean="0">
+                              <a:latin typeface="Cambria Math" panose="02040503050406030204" pitchFamily="18" charset="0"/>
+                            </a:rPr>
+                            <m:t>2</m:t>
+                          </m:r>
+                        </m:sub>
+                      </m:sSub>
+                    </m:oMath>
+                  </m:oMathPara>
+                </a14:m>
+                <a:endParaRPr lang="en-US" b="0" dirty="0" smtClean="0"/>
+              </a:p>
+            </p:txBody>
+          </p:sp>
+        </mc:Choice>
+        <mc:Fallback>
+          <p:sp>
+            <p:nvSpPr>
+              <p:cNvPr id="32" name="TextBox 31"/>
+              <p:cNvSpPr txBox="1">
+                <a:spLocks noRot="1" noChangeAspect="1" noMove="1" noResize="1" noEditPoints="1" noAdjustHandles="1" noChangeArrowheads="1" noChangeShapeType="1" noTextEdit="1"/>
+              </p:cNvSpPr>
+              <p:nvPr/>
+            </p:nvSpPr>
+            <p:spPr>
+              <a:xfrm>
+                <a:off x="4315105" y="1942344"/>
+                <a:ext cx="466090" cy="369332"/>
+              </a:xfrm>
+              <a:prstGeom prst="rect">
+                <a:avLst/>
+              </a:prstGeom>
+              <a:blipFill rotWithShape="0">
+                <a:blip r:embed="rId8"/>
+                <a:stretch>
+                  <a:fillRect/>
+                </a:stretch>
+              </a:blipFill>
+            </p:spPr>
+            <p:txBody>
+              <a:bodyPr/>
+              <a:lstStyle/>
+              <a:p>
+                <a:r>
+                  <a:rPr lang="en-US">
+                    <a:noFill/>
+                  </a:rPr>
+                  <a:t> </a:t>
+                </a:r>
+              </a:p>
+            </p:txBody>
+          </p:sp>
+        </mc:Fallback>
+      </mc:AlternateContent>
     </p:spTree>
     <p:extLst>
       <p:ext uri="{BB962C8B-B14F-4D97-AF65-F5344CB8AC3E}">

</xml_diff>

<commit_message>
Completed related works section and redid figure.
</commit_message>
<xml_diff>
--- a/figures/GlobalGameSetup.pptx
+++ b/figures/GlobalGameSetup.pptx
@@ -243,7 +243,7 @@
           <a:p>
             <a:fld id="{9BF37CAF-DAD9-447A-84B9-D54918012BD3}" type="datetimeFigureOut">
               <a:rPr lang="en-US" smtClean="0"/>
-              <a:t>1/14/2015</a:t>
+              <a:t>2/26/2015</a:t>
             </a:fld>
             <a:endParaRPr lang="en-US"/>
           </a:p>
@@ -413,7 +413,7 @@
           <a:p>
             <a:fld id="{9BF37CAF-DAD9-447A-84B9-D54918012BD3}" type="datetimeFigureOut">
               <a:rPr lang="en-US" smtClean="0"/>
-              <a:t>1/14/2015</a:t>
+              <a:t>2/26/2015</a:t>
             </a:fld>
             <a:endParaRPr lang="en-US"/>
           </a:p>
@@ -593,7 +593,7 @@
           <a:p>
             <a:fld id="{9BF37CAF-DAD9-447A-84B9-D54918012BD3}" type="datetimeFigureOut">
               <a:rPr lang="en-US" smtClean="0"/>
-              <a:t>1/14/2015</a:t>
+              <a:t>2/26/2015</a:t>
             </a:fld>
             <a:endParaRPr lang="en-US"/>
           </a:p>
@@ -763,7 +763,7 @@
           <a:p>
             <a:fld id="{9BF37CAF-DAD9-447A-84B9-D54918012BD3}" type="datetimeFigureOut">
               <a:rPr lang="en-US" smtClean="0"/>
-              <a:t>1/14/2015</a:t>
+              <a:t>2/26/2015</a:t>
             </a:fld>
             <a:endParaRPr lang="en-US"/>
           </a:p>
@@ -1009,7 +1009,7 @@
           <a:p>
             <a:fld id="{9BF37CAF-DAD9-447A-84B9-D54918012BD3}" type="datetimeFigureOut">
               <a:rPr lang="en-US" smtClean="0"/>
-              <a:t>1/14/2015</a:t>
+              <a:t>2/26/2015</a:t>
             </a:fld>
             <a:endParaRPr lang="en-US"/>
           </a:p>
@@ -1241,7 +1241,7 @@
           <a:p>
             <a:fld id="{9BF37CAF-DAD9-447A-84B9-D54918012BD3}" type="datetimeFigureOut">
               <a:rPr lang="en-US" smtClean="0"/>
-              <a:t>1/14/2015</a:t>
+              <a:t>2/26/2015</a:t>
             </a:fld>
             <a:endParaRPr lang="en-US"/>
           </a:p>
@@ -1608,7 +1608,7 @@
           <a:p>
             <a:fld id="{9BF37CAF-DAD9-447A-84B9-D54918012BD3}" type="datetimeFigureOut">
               <a:rPr lang="en-US" smtClean="0"/>
-              <a:t>1/14/2015</a:t>
+              <a:t>2/26/2015</a:t>
             </a:fld>
             <a:endParaRPr lang="en-US"/>
           </a:p>
@@ -1726,7 +1726,7 @@
           <a:p>
             <a:fld id="{9BF37CAF-DAD9-447A-84B9-D54918012BD3}" type="datetimeFigureOut">
               <a:rPr lang="en-US" smtClean="0"/>
-              <a:t>1/14/2015</a:t>
+              <a:t>2/26/2015</a:t>
             </a:fld>
             <a:endParaRPr lang="en-US"/>
           </a:p>
@@ -1821,7 +1821,7 @@
           <a:p>
             <a:fld id="{9BF37CAF-DAD9-447A-84B9-D54918012BD3}" type="datetimeFigureOut">
               <a:rPr lang="en-US" smtClean="0"/>
-              <a:t>1/14/2015</a:t>
+              <a:t>2/26/2015</a:t>
             </a:fld>
             <a:endParaRPr lang="en-US"/>
           </a:p>
@@ -2098,7 +2098,7 @@
           <a:p>
             <a:fld id="{9BF37CAF-DAD9-447A-84B9-D54918012BD3}" type="datetimeFigureOut">
               <a:rPr lang="en-US" smtClean="0"/>
-              <a:t>1/14/2015</a:t>
+              <a:t>2/26/2015</a:t>
             </a:fld>
             <a:endParaRPr lang="en-US"/>
           </a:p>
@@ -2351,7 +2351,7 @@
           <a:p>
             <a:fld id="{9BF37CAF-DAD9-447A-84B9-D54918012BD3}" type="datetimeFigureOut">
               <a:rPr lang="en-US" smtClean="0"/>
-              <a:t>1/14/2015</a:t>
+              <a:t>2/26/2015</a:t>
             </a:fld>
             <a:endParaRPr lang="en-US"/>
           </a:p>
@@ -2564,7 +2564,7 @@
           <a:p>
             <a:fld id="{9BF37CAF-DAD9-447A-84B9-D54918012BD3}" type="datetimeFigureOut">
               <a:rPr lang="en-US" smtClean="0"/>
-              <a:t>1/14/2015</a:t>
+              <a:t>2/26/2015</a:t>
             </a:fld>
             <a:endParaRPr lang="en-US"/>
           </a:p>
@@ -2969,8 +2969,8 @@
           <a:chExt cx="0" cy="0"/>
         </a:xfrm>
       </p:grpSpPr>
-      <mc:AlternateContent xmlns:mc="http://schemas.openxmlformats.org/markup-compatibility/2006" xmlns:a14="http://schemas.microsoft.com/office/drawing/2010/main">
-        <mc:Choice Requires="a14">
+      <mc:AlternateContent xmlns:mc="http://schemas.openxmlformats.org/markup-compatibility/2006">
+        <mc:Choice xmlns:a14="http://schemas.microsoft.com/office/drawing/2010/main" Requires="a14">
           <p:sp>
             <p:nvSpPr>
               <p:cNvPr id="5" name="Oval 4"/>
@@ -2979,8 +2979,8 @@
             </p:nvSpPr>
             <p:spPr>
               <a:xfrm>
-                <a:off x="711199" y="727075"/>
-                <a:ext cx="3517901" cy="3517901"/>
+                <a:off x="872002" y="906726"/>
+                <a:ext cx="3175497" cy="3142216"/>
               </a:xfrm>
               <a:prstGeom prst="ellipse">
                 <a:avLst/>
@@ -3039,20 +3039,20 @@
                     </m:oMathParaPr>
                     <m:oMath xmlns:m="http://schemas.openxmlformats.org/officeDocument/2006/math">
                       <m:r>
-                        <a:rPr lang="en-US" sz="4000" b="0" i="1" smtClean="0">
+                        <a:rPr lang="en-US" sz="5400" b="0" i="1" smtClean="0">
                           <a:latin typeface="Cambria Math" panose="02040503050406030204" pitchFamily="18" charset="0"/>
                         </a:rPr>
-                        <m:t>𝜃</m:t>
+                        <m:t>𝜏</m:t>
                       </m:r>
                     </m:oMath>
                   </m:oMathPara>
                 </a14:m>
-                <a:endParaRPr lang="en-US" dirty="0"/>
+                <a:endParaRPr lang="en-US" sz="4800" dirty="0"/>
               </a:p>
             </p:txBody>
           </p:sp>
         </mc:Choice>
-        <mc:Fallback xmlns="">
+        <mc:Fallback>
           <p:sp>
             <p:nvSpPr>
               <p:cNvPr id="5" name="Oval 4"/>
@@ -3063,8 +3063,8 @@
             </p:nvSpPr>
             <p:spPr>
               <a:xfrm>
-                <a:off x="711199" y="727075"/>
-                <a:ext cx="3517901" cy="3517901"/>
+                <a:off x="872002" y="906726"/>
+                <a:ext cx="3175497" cy="3142216"/>
               </a:xfrm>
               <a:prstGeom prst="ellipse">
                 <a:avLst/>
@@ -3106,8 +3106,8 @@
         </p:nvCxnSpPr>
         <p:spPr>
           <a:xfrm flipV="1">
-            <a:off x="2568623" y="1242260"/>
-            <a:ext cx="1145292" cy="980436"/>
+            <a:off x="2629769" y="1366893"/>
+            <a:ext cx="952689" cy="871432"/>
           </a:xfrm>
           <a:prstGeom prst="line">
             <a:avLst/>
@@ -3144,9 +3144,9 @@
           <p:nvPr/>
         </p:nvCxnSpPr>
         <p:spPr>
-          <a:xfrm>
-            <a:off x="2700997" y="2486025"/>
-            <a:ext cx="1528103" cy="1"/>
+          <a:xfrm flipV="1">
+            <a:off x="2629769" y="2477834"/>
+            <a:ext cx="1417730" cy="12358"/>
           </a:xfrm>
           <a:prstGeom prst="line">
             <a:avLst/>
@@ -3184,8 +3184,8 @@
         </p:nvCxnSpPr>
         <p:spPr>
           <a:xfrm>
-            <a:off x="2568623" y="2749355"/>
-            <a:ext cx="1145292" cy="980436"/>
+            <a:off x="2629769" y="2707024"/>
+            <a:ext cx="952689" cy="881751"/>
           </a:xfrm>
           <a:prstGeom prst="line">
             <a:avLst/>
@@ -3217,117 +3217,14 @@
         <mc:Choice xmlns:a14="http://schemas.microsoft.com/office/drawing/2010/main" Requires="a14">
           <p:sp>
             <p:nvSpPr>
-              <p:cNvPr id="15" name="TextBox 14"/>
-              <p:cNvSpPr txBox="1"/>
-              <p:nvPr/>
-            </p:nvSpPr>
-            <p:spPr>
-              <a:xfrm>
-                <a:off x="3686402" y="4071784"/>
-                <a:ext cx="466090" cy="369332"/>
-              </a:xfrm>
-              <a:prstGeom prst="rect">
-                <a:avLst/>
-              </a:prstGeom>
-              <a:noFill/>
-            </p:spPr>
-            <p:txBody>
-              <a:bodyPr wrap="none" rtlCol="0">
-                <a:spAutoFit/>
-              </a:bodyPr>
-              <a:lstStyle/>
-              <a:p>
-                <a:pPr/>
-                <a14:m>
-                  <m:oMathPara xmlns:m="http://schemas.openxmlformats.org/officeDocument/2006/math">
-                    <m:oMathParaPr>
-                      <m:jc m:val="centerGroup"/>
-                    </m:oMathParaPr>
-                    <m:oMath xmlns:m="http://schemas.openxmlformats.org/officeDocument/2006/math">
-                      <m:sSub>
-                        <m:sSubPr>
-                          <m:ctrlPr>
-                            <a:rPr lang="en-US" b="0" i="1" smtClean="0">
-                              <a:latin typeface="Cambria Math" panose="02040503050406030204" pitchFamily="18" charset="0"/>
-                            </a:rPr>
-                          </m:ctrlPr>
-                        </m:sSubPr>
-                        <m:e>
-                          <m:r>
-                            <a:rPr lang="en-US" b="0" i="1" smtClean="0">
-                              <a:latin typeface="Cambria Math" panose="02040503050406030204" pitchFamily="18" charset="0"/>
-                            </a:rPr>
-                            <m:t>𝑥</m:t>
-                          </m:r>
-                        </m:e>
-                        <m:sub>
-                          <m:r>
-                            <a:rPr lang="en-US" b="0" i="1" smtClean="0">
-                              <a:latin typeface="Cambria Math" panose="02040503050406030204" pitchFamily="18" charset="0"/>
-                            </a:rPr>
-                            <m:t>3</m:t>
-                          </m:r>
-                        </m:sub>
-                      </m:sSub>
-                    </m:oMath>
-                  </m:oMathPara>
-                </a14:m>
-                <a:endParaRPr lang="en-US" b="0" dirty="0" smtClean="0"/>
-              </a:p>
-            </p:txBody>
-          </p:sp>
-        </mc:Choice>
-        <mc:Fallback>
-          <p:sp>
-            <p:nvSpPr>
-              <p:cNvPr id="15" name="TextBox 14"/>
-              <p:cNvSpPr txBox="1">
-                <a:spLocks noRot="1" noChangeAspect="1" noMove="1" noResize="1" noEditPoints="1" noAdjustHandles="1" noChangeArrowheads="1" noChangeShapeType="1" noTextEdit="1"/>
-              </p:cNvSpPr>
-              <p:nvPr/>
-            </p:nvSpPr>
-            <p:spPr>
-              <a:xfrm>
-                <a:off x="3686402" y="4071784"/>
-                <a:ext cx="466090" cy="369332"/>
-              </a:xfrm>
-              <a:prstGeom prst="rect">
-                <a:avLst/>
-              </a:prstGeom>
-              <a:blipFill rotWithShape="0">
-                <a:blip r:embed="rId3"/>
-                <a:stretch>
-                  <a:fillRect/>
-                </a:stretch>
-              </a:blipFill>
-            </p:spPr>
-            <p:txBody>
-              <a:bodyPr/>
-              <a:lstStyle/>
-              <a:p>
-                <a:r>
-                  <a:rPr lang="en-US">
-                    <a:noFill/>
-                  </a:rPr>
-                  <a:t> </a:t>
-                </a:r>
-              </a:p>
-            </p:txBody>
-          </p:sp>
-        </mc:Fallback>
-      </mc:AlternateContent>
-      <mc:AlternateContent xmlns:mc="http://schemas.openxmlformats.org/markup-compatibility/2006">
-        <mc:Choice xmlns:a14="http://schemas.microsoft.com/office/drawing/2010/main" Requires="a14">
-          <p:sp>
-            <p:nvSpPr>
               <p:cNvPr id="16" name="TextBox 15"/>
               <p:cNvSpPr txBox="1"/>
               <p:nvPr/>
             </p:nvSpPr>
             <p:spPr>
               <a:xfrm>
-                <a:off x="3153708" y="2155015"/>
-                <a:ext cx="576312" cy="338554"/>
+                <a:off x="3250174" y="2081106"/>
+                <a:ext cx="587533" cy="338554"/>
               </a:xfrm>
               <a:prstGeom prst="rect">
                 <a:avLst/>
@@ -3369,13 +3266,13 @@
                         </m:sSubPr>
                         <m:e>
                           <m:r>
-                            <a:rPr lang="en-US" sz="1600" i="1">
+                            <a:rPr lang="en-US" sz="1600" b="0" i="1" smtClean="0">
                               <a:solidFill>
                                 <a:schemeClr val="bg1"/>
                               </a:solidFill>
                               <a:latin typeface="Cambria Math" panose="02040503050406030204" pitchFamily="18" charset="0"/>
                             </a:rPr>
-                            <m:t>𝜖</m:t>
+                            <m:t>𝜂</m:t>
                           </m:r>
                         </m:e>
                         <m:sub>
@@ -3413,16 +3310,16 @@
             </p:nvSpPr>
             <p:spPr>
               <a:xfrm>
-                <a:off x="3153708" y="2155015"/>
-                <a:ext cx="576312" cy="338554"/>
+                <a:off x="3250174" y="2081106"/>
+                <a:ext cx="587533" cy="338554"/>
               </a:xfrm>
               <a:prstGeom prst="rect">
                 <a:avLst/>
               </a:prstGeom>
               <a:blipFill rotWithShape="0">
-                <a:blip r:embed="rId4"/>
+                <a:blip r:embed="rId3"/>
                 <a:stretch>
-                  <a:fillRect/>
+                  <a:fillRect b="-3571"/>
                 </a:stretch>
               </a:blipFill>
             </p:spPr>
@@ -3451,8 +3348,8 @@
             </p:nvSpPr>
             <p:spPr>
               <a:xfrm>
-                <a:off x="3206081" y="562174"/>
-                <a:ext cx="1383840" cy="369332"/>
+                <a:off x="3125874" y="660421"/>
+                <a:ext cx="1372427" cy="369332"/>
               </a:xfrm>
               <a:prstGeom prst="rect">
                 <a:avLst/>
@@ -3507,7 +3404,7 @@
                         <a:rPr lang="en-US" b="0" i="1" smtClean="0">
                           <a:latin typeface="Cambria Math" panose="02040503050406030204" pitchFamily="18" charset="0"/>
                         </a:rPr>
-                        <m:t>𝜃</m:t>
+                        <m:t>𝜏</m:t>
                       </m:r>
                       <m:r>
                         <a:rPr lang="en-US" b="0" i="1" smtClean="0">
@@ -3528,7 +3425,7 @@
                             <a:rPr lang="en-US" b="0" i="1" smtClean="0">
                               <a:latin typeface="Cambria Math" panose="02040503050406030204" pitchFamily="18" charset="0"/>
                             </a:rPr>
-                            <m:t>𝜖</m:t>
+                            <m:t>𝜂</m:t>
                           </m:r>
                         </m:e>
                         <m:sub>
@@ -3559,16 +3456,16 @@
             </p:nvSpPr>
             <p:spPr>
               <a:xfrm>
-                <a:off x="3206081" y="562174"/>
-                <a:ext cx="1383840" cy="369332"/>
+                <a:off x="3125874" y="660421"/>
+                <a:ext cx="1372427" cy="369332"/>
               </a:xfrm>
               <a:prstGeom prst="rect">
                 <a:avLst/>
               </a:prstGeom>
               <a:blipFill rotWithShape="0">
-                <a:blip r:embed="rId5"/>
+                <a:blip r:embed="rId4"/>
                 <a:stretch>
-                  <a:fillRect/>
+                  <a:fillRect b="-6557"/>
                 </a:stretch>
               </a:blipFill>
             </p:spPr>
@@ -3595,7 +3492,7 @@
         </p:nvGrpSpPr>
         <p:grpSpPr>
           <a:xfrm rot="19235259">
-            <a:off x="3694020" y="891601"/>
+            <a:off x="3613813" y="989848"/>
             <a:ext cx="407963" cy="407963"/>
             <a:chOff x="7188591" y="337625"/>
             <a:chExt cx="3291840" cy="3291840"/>
@@ -3759,7 +3656,7 @@
         </p:nvGrpSpPr>
         <p:grpSpPr>
           <a:xfrm>
-            <a:off x="4294321" y="2281995"/>
+            <a:off x="4197777" y="2327217"/>
             <a:ext cx="407963" cy="407963"/>
             <a:chOff x="7188591" y="337625"/>
             <a:chExt cx="3291840" cy="3291840"/>
@@ -3923,7 +3820,7 @@
         </p:nvGrpSpPr>
         <p:grpSpPr>
           <a:xfrm rot="2217289">
-            <a:off x="3725308" y="3718981"/>
+            <a:off x="3575179" y="3595759"/>
             <a:ext cx="407963" cy="407963"/>
             <a:chOff x="7188591" y="337625"/>
             <a:chExt cx="3291840" cy="3291840"/>
@@ -4090,7 +3987,7 @@
             <p:spPr>
               <a:xfrm>
                 <a:off x="2720285" y="1365281"/>
-                <a:ext cx="571567" cy="338554"/>
+                <a:ext cx="582788" cy="338554"/>
               </a:xfrm>
               <a:prstGeom prst="rect">
                 <a:avLst/>
@@ -4132,13 +4029,13 @@
                         </m:sSubPr>
                         <m:e>
                           <m:r>
-                            <a:rPr lang="en-US" sz="1600" i="1">
+                            <a:rPr lang="en-US" sz="1600" b="0" i="1" smtClean="0">
                               <a:solidFill>
                                 <a:schemeClr val="bg1"/>
                               </a:solidFill>
                               <a:latin typeface="Cambria Math" panose="02040503050406030204" pitchFamily="18" charset="0"/>
                             </a:rPr>
-                            <m:t>𝜖</m:t>
+                            <m:t>𝜂</m:t>
                           </m:r>
                         </m:e>
                         <m:sub>
@@ -4177,15 +4074,15 @@
             <p:spPr>
               <a:xfrm>
                 <a:off x="2720285" y="1365281"/>
-                <a:ext cx="571567" cy="338554"/>
+                <a:ext cx="582788" cy="338554"/>
               </a:xfrm>
               <a:prstGeom prst="rect">
                 <a:avLst/>
               </a:prstGeom>
               <a:blipFill rotWithShape="0">
-                <a:blip r:embed="rId6"/>
+                <a:blip r:embed="rId5"/>
                 <a:stretch>
-                  <a:fillRect/>
+                  <a:fillRect b="-1786"/>
                 </a:stretch>
               </a:blipFill>
             </p:spPr>
@@ -4215,7 +4112,7 @@
             <p:spPr>
               <a:xfrm>
                 <a:off x="2629769" y="3099252"/>
-                <a:ext cx="576312" cy="338554"/>
+                <a:ext cx="587533" cy="338554"/>
               </a:xfrm>
               <a:prstGeom prst="rect">
                 <a:avLst/>
@@ -4257,13 +4154,13 @@
                         </m:sSubPr>
                         <m:e>
                           <m:r>
-                            <a:rPr lang="en-US" sz="1600" i="1">
+                            <a:rPr lang="en-US" sz="1600" b="0" i="1" smtClean="0">
                               <a:solidFill>
                                 <a:schemeClr val="bg1"/>
                               </a:solidFill>
                               <a:latin typeface="Cambria Math" panose="02040503050406030204" pitchFamily="18" charset="0"/>
                             </a:rPr>
-                            <m:t>𝜖</m:t>
+                            <m:t>𝜂</m:t>
                           </m:r>
                         </m:e>
                         <m:sub>
@@ -4302,15 +4199,15 @@
             <p:spPr>
               <a:xfrm>
                 <a:off x="2629769" y="3099252"/>
-                <a:ext cx="576312" cy="338554"/>
+                <a:ext cx="587533" cy="338554"/>
               </a:xfrm>
               <a:prstGeom prst="rect">
                 <a:avLst/>
               </a:prstGeom>
               <a:blipFill rotWithShape="0">
-                <a:blip r:embed="rId7"/>
+                <a:blip r:embed="rId6"/>
                 <a:stretch>
-                  <a:fillRect/>
+                  <a:fillRect b="-3571"/>
                 </a:stretch>
               </a:blipFill>
             </p:spPr>
@@ -4333,14 +4230,14 @@
         <mc:Choice xmlns:a14="http://schemas.microsoft.com/office/drawing/2010/main" Requires="a14">
           <p:sp>
             <p:nvSpPr>
-              <p:cNvPr id="32" name="TextBox 31"/>
+              <p:cNvPr id="33" name="TextBox 32"/>
               <p:cNvSpPr txBox="1"/>
               <p:nvPr/>
             </p:nvSpPr>
             <p:spPr>
               <a:xfrm>
-                <a:off x="4315105" y="1942344"/>
-                <a:ext cx="466090" cy="369332"/>
+                <a:off x="3914204" y="1979546"/>
+                <a:ext cx="1383071" cy="369332"/>
               </a:xfrm>
               <a:prstGeom prst="rect">
                 <a:avLst/>
@@ -4385,6 +4282,49 @@
                           </m:r>
                         </m:sub>
                       </m:sSub>
+                      <m:r>
+                        <a:rPr lang="en-US" b="0" i="1" smtClean="0">
+                          <a:latin typeface="Cambria Math" panose="02040503050406030204" pitchFamily="18" charset="0"/>
+                        </a:rPr>
+                        <m:t>=</m:t>
+                      </m:r>
+                      <m:r>
+                        <a:rPr lang="en-US" b="0" i="1" smtClean="0">
+                          <a:latin typeface="Cambria Math" panose="02040503050406030204" pitchFamily="18" charset="0"/>
+                        </a:rPr>
+                        <m:t>𝜏</m:t>
+                      </m:r>
+                      <m:r>
+                        <a:rPr lang="en-US" b="0" i="1" smtClean="0">
+                          <a:latin typeface="Cambria Math" panose="02040503050406030204" pitchFamily="18" charset="0"/>
+                        </a:rPr>
+                        <m:t>+</m:t>
+                      </m:r>
+                      <m:sSub>
+                        <m:sSubPr>
+                          <m:ctrlPr>
+                            <a:rPr lang="en-US" b="0" i="1" smtClean="0">
+                              <a:latin typeface="Cambria Math" panose="02040503050406030204" pitchFamily="18" charset="0"/>
+                            </a:rPr>
+                          </m:ctrlPr>
+                        </m:sSubPr>
+                        <m:e>
+                          <m:r>
+                            <a:rPr lang="en-US" b="0" i="1" smtClean="0">
+                              <a:latin typeface="Cambria Math" panose="02040503050406030204" pitchFamily="18" charset="0"/>
+                            </a:rPr>
+                            <m:t>𝜂</m:t>
+                          </m:r>
+                        </m:e>
+                        <m:sub>
+                          <m:r>
+                            <a:rPr lang="en-US" b="0" i="1" smtClean="0">
+                              <a:latin typeface="Cambria Math" panose="02040503050406030204" pitchFamily="18" charset="0"/>
+                            </a:rPr>
+                            <m:t>2</m:t>
+                          </m:r>
+                        </m:sub>
+                      </m:sSub>
                     </m:oMath>
                   </m:oMathPara>
                 </a14:m>
@@ -4396,7 +4336,7 @@
         <mc:Fallback>
           <p:sp>
             <p:nvSpPr>
-              <p:cNvPr id="32" name="TextBox 31"/>
+              <p:cNvPr id="33" name="TextBox 32"/>
               <p:cNvSpPr txBox="1">
                 <a:spLocks noRot="1" noChangeAspect="1" noMove="1" noResize="1" noEditPoints="1" noAdjustHandles="1" noChangeArrowheads="1" noChangeShapeType="1" noTextEdit="1"/>
               </p:cNvSpPr>
@@ -4404,16 +4344,16 @@
             </p:nvSpPr>
             <p:spPr>
               <a:xfrm>
-                <a:off x="4315105" y="1942344"/>
-                <a:ext cx="466090" cy="369332"/>
+                <a:off x="3914204" y="1979546"/>
+                <a:ext cx="1383071" cy="369332"/>
               </a:xfrm>
               <a:prstGeom prst="rect">
                 <a:avLst/>
               </a:prstGeom>
               <a:blipFill rotWithShape="0">
-                <a:blip r:embed="rId8"/>
+                <a:blip r:embed="rId7"/>
                 <a:stretch>
-                  <a:fillRect/>
+                  <a:fillRect b="-6667"/>
                 </a:stretch>
               </a:blipFill>
             </p:spPr>
@@ -4432,6 +4372,1643 @@
           </p:sp>
         </mc:Fallback>
       </mc:AlternateContent>
+      <mc:AlternateContent xmlns:mc="http://schemas.openxmlformats.org/markup-compatibility/2006">
+        <mc:Choice xmlns:a14="http://schemas.microsoft.com/office/drawing/2010/main" Requires="a14">
+          <p:sp>
+            <p:nvSpPr>
+              <p:cNvPr id="34" name="TextBox 33"/>
+              <p:cNvSpPr txBox="1"/>
+              <p:nvPr/>
+            </p:nvSpPr>
+            <p:spPr>
+              <a:xfrm>
+                <a:off x="3149436" y="3976709"/>
+                <a:ext cx="1383071" cy="369332"/>
+              </a:xfrm>
+              <a:prstGeom prst="rect">
+                <a:avLst/>
+              </a:prstGeom>
+              <a:noFill/>
+            </p:spPr>
+            <p:txBody>
+              <a:bodyPr wrap="none" rtlCol="0">
+                <a:spAutoFit/>
+              </a:bodyPr>
+              <a:lstStyle/>
+              <a:p>
+                <a:pPr/>
+                <a14:m>
+                  <m:oMathPara xmlns:m="http://schemas.openxmlformats.org/officeDocument/2006/math">
+                    <m:oMathParaPr>
+                      <m:jc m:val="centerGroup"/>
+                    </m:oMathParaPr>
+                    <m:oMath xmlns:m="http://schemas.openxmlformats.org/officeDocument/2006/math">
+                      <m:sSub>
+                        <m:sSubPr>
+                          <m:ctrlPr>
+                            <a:rPr lang="en-US" b="0" i="1" smtClean="0">
+                              <a:latin typeface="Cambria Math" panose="02040503050406030204" pitchFamily="18" charset="0"/>
+                            </a:rPr>
+                          </m:ctrlPr>
+                        </m:sSubPr>
+                        <m:e>
+                          <m:r>
+                            <a:rPr lang="en-US" b="0" i="1" smtClean="0">
+                              <a:latin typeface="Cambria Math" panose="02040503050406030204" pitchFamily="18" charset="0"/>
+                            </a:rPr>
+                            <m:t>𝑥</m:t>
+                          </m:r>
+                        </m:e>
+                        <m:sub>
+                          <m:r>
+                            <a:rPr lang="en-US" b="0" i="1" smtClean="0">
+                              <a:latin typeface="Cambria Math" panose="02040503050406030204" pitchFamily="18" charset="0"/>
+                            </a:rPr>
+                            <m:t>3</m:t>
+                          </m:r>
+                        </m:sub>
+                      </m:sSub>
+                      <m:r>
+                        <a:rPr lang="en-US" b="0" i="1" smtClean="0">
+                          <a:latin typeface="Cambria Math" panose="02040503050406030204" pitchFamily="18" charset="0"/>
+                        </a:rPr>
+                        <m:t>=</m:t>
+                      </m:r>
+                      <m:r>
+                        <a:rPr lang="en-US" b="0" i="1" smtClean="0">
+                          <a:latin typeface="Cambria Math" panose="02040503050406030204" pitchFamily="18" charset="0"/>
+                        </a:rPr>
+                        <m:t>𝜏</m:t>
+                      </m:r>
+                      <m:r>
+                        <a:rPr lang="en-US" b="0" i="1" smtClean="0">
+                          <a:latin typeface="Cambria Math" panose="02040503050406030204" pitchFamily="18" charset="0"/>
+                        </a:rPr>
+                        <m:t>+</m:t>
+                      </m:r>
+                      <m:sSub>
+                        <m:sSubPr>
+                          <m:ctrlPr>
+                            <a:rPr lang="en-US" b="0" i="1" smtClean="0">
+                              <a:latin typeface="Cambria Math" panose="02040503050406030204" pitchFamily="18" charset="0"/>
+                            </a:rPr>
+                          </m:ctrlPr>
+                        </m:sSubPr>
+                        <m:e>
+                          <m:r>
+                            <a:rPr lang="en-US" b="0" i="1" smtClean="0">
+                              <a:latin typeface="Cambria Math" panose="02040503050406030204" pitchFamily="18" charset="0"/>
+                            </a:rPr>
+                            <m:t>𝜂</m:t>
+                          </m:r>
+                        </m:e>
+                        <m:sub>
+                          <m:r>
+                            <a:rPr lang="en-US" b="0" i="1" smtClean="0">
+                              <a:latin typeface="Cambria Math" panose="02040503050406030204" pitchFamily="18" charset="0"/>
+                            </a:rPr>
+                            <m:t>3</m:t>
+                          </m:r>
+                        </m:sub>
+                      </m:sSub>
+                    </m:oMath>
+                  </m:oMathPara>
+                </a14:m>
+                <a:endParaRPr lang="en-US" b="0" dirty="0" smtClean="0"/>
+              </a:p>
+            </p:txBody>
+          </p:sp>
+        </mc:Choice>
+        <mc:Fallback>
+          <p:sp>
+            <p:nvSpPr>
+              <p:cNvPr id="34" name="TextBox 33"/>
+              <p:cNvSpPr txBox="1">
+                <a:spLocks noRot="1" noChangeAspect="1" noMove="1" noResize="1" noEditPoints="1" noAdjustHandles="1" noChangeArrowheads="1" noChangeShapeType="1" noTextEdit="1"/>
+              </p:cNvSpPr>
+              <p:nvPr/>
+            </p:nvSpPr>
+            <p:spPr>
+              <a:xfrm>
+                <a:off x="3149436" y="3976709"/>
+                <a:ext cx="1383071" cy="369332"/>
+              </a:xfrm>
+              <a:prstGeom prst="rect">
+                <a:avLst/>
+              </a:prstGeom>
+              <a:blipFill rotWithShape="0">
+                <a:blip r:embed="rId8"/>
+                <a:stretch>
+                  <a:fillRect b="-6557"/>
+                </a:stretch>
+              </a:blipFill>
+            </p:spPr>
+            <p:txBody>
+              <a:bodyPr/>
+              <a:lstStyle/>
+              <a:p>
+                <a:r>
+                  <a:rPr lang="en-US">
+                    <a:noFill/>
+                  </a:rPr>
+                  <a:t> </a:t>
+                </a:r>
+              </a:p>
+            </p:txBody>
+          </p:sp>
+        </mc:Fallback>
+      </mc:AlternateContent>
+      <p:grpSp>
+        <p:nvGrpSpPr>
+          <p:cNvPr id="35" name="Group 34"/>
+          <p:cNvGrpSpPr/>
+          <p:nvPr/>
+        </p:nvGrpSpPr>
+        <p:grpSpPr>
+          <a:xfrm rot="13406099">
+            <a:off x="823082" y="1103469"/>
+            <a:ext cx="407963" cy="407963"/>
+            <a:chOff x="7188591" y="337625"/>
+            <a:chExt cx="3291840" cy="3291840"/>
+          </a:xfrm>
+        </p:grpSpPr>
+        <p:sp>
+          <p:nvSpPr>
+            <p:cNvPr id="36" name="Donut 35"/>
+            <p:cNvSpPr/>
+            <p:nvPr/>
+          </p:nvSpPr>
+          <p:spPr>
+            <a:xfrm>
+              <a:off x="7188591" y="337625"/>
+              <a:ext cx="3291840" cy="3291840"/>
+            </a:xfrm>
+            <a:prstGeom prst="donut">
+              <a:avLst>
+                <a:gd name="adj" fmla="val 12093"/>
+              </a:avLst>
+            </a:prstGeom>
+            <a:gradFill flip="none" rotWithShape="1">
+              <a:gsLst>
+                <a:gs pos="0">
+                  <a:schemeClr val="accent5">
+                    <a:lumMod val="0"/>
+                    <a:lumOff val="100000"/>
+                  </a:schemeClr>
+                </a:gs>
+                <a:gs pos="43000">
+                  <a:schemeClr val="accent5">
+                    <a:lumMod val="0"/>
+                    <a:lumOff val="100000"/>
+                  </a:schemeClr>
+                </a:gs>
+                <a:gs pos="100000">
+                  <a:schemeClr val="accent5">
+                    <a:lumMod val="100000"/>
+                  </a:schemeClr>
+                </a:gs>
+              </a:gsLst>
+              <a:path path="circle">
+                <a:fillToRect l="50000" t="50000" r="50000" b="50000"/>
+              </a:path>
+              <a:tileRect/>
+            </a:gradFill>
+          </p:spPr>
+          <p:style>
+            <a:lnRef idx="2">
+              <a:schemeClr val="accent1">
+                <a:shade val="50000"/>
+              </a:schemeClr>
+            </a:lnRef>
+            <a:fillRef idx="1">
+              <a:schemeClr val="accent1"/>
+            </a:fillRef>
+            <a:effectRef idx="0">
+              <a:schemeClr val="accent1"/>
+            </a:effectRef>
+            <a:fontRef idx="minor">
+              <a:schemeClr val="lt1"/>
+            </a:fontRef>
+          </p:style>
+          <p:txBody>
+            <a:bodyPr rtlCol="0" anchor="ctr"/>
+            <a:lstStyle/>
+            <a:p>
+              <a:pPr algn="ctr"/>
+              <a:endParaRPr lang="en-US">
+                <a:solidFill>
+                  <a:schemeClr val="tx1"/>
+                </a:solidFill>
+              </a:endParaRPr>
+            </a:p>
+          </p:txBody>
+        </p:sp>
+        <p:sp>
+          <p:nvSpPr>
+            <p:cNvPr id="37" name="Oval 36"/>
+            <p:cNvSpPr/>
+            <p:nvPr/>
+          </p:nvSpPr>
+          <p:spPr>
+            <a:xfrm>
+              <a:off x="7818480" y="962233"/>
+              <a:ext cx="2033696" cy="2042624"/>
+            </a:xfrm>
+            <a:prstGeom prst="ellipse">
+              <a:avLst/>
+            </a:prstGeom>
+          </p:spPr>
+          <p:style>
+            <a:lnRef idx="2">
+              <a:schemeClr val="dk1">
+                <a:shade val="50000"/>
+              </a:schemeClr>
+            </a:lnRef>
+            <a:fillRef idx="1">
+              <a:schemeClr val="dk1"/>
+            </a:fillRef>
+            <a:effectRef idx="0">
+              <a:schemeClr val="dk1"/>
+            </a:effectRef>
+            <a:fontRef idx="minor">
+              <a:schemeClr val="lt1"/>
+            </a:fontRef>
+          </p:style>
+          <p:txBody>
+            <a:bodyPr rtlCol="0" anchor="ctr"/>
+            <a:lstStyle/>
+            <a:p>
+              <a:pPr algn="ctr"/>
+              <a:endParaRPr lang="en-US"/>
+            </a:p>
+          </p:txBody>
+        </p:sp>
+        <p:sp>
+          <p:nvSpPr>
+            <p:cNvPr id="38" name="Rectangle 37"/>
+            <p:cNvSpPr/>
+            <p:nvPr/>
+          </p:nvSpPr>
+          <p:spPr>
+            <a:xfrm>
+              <a:off x="7976382" y="1732478"/>
+              <a:ext cx="239150" cy="490218"/>
+            </a:xfrm>
+            <a:prstGeom prst="rect">
+              <a:avLst/>
+            </a:prstGeom>
+          </p:spPr>
+          <p:style>
+            <a:lnRef idx="2">
+              <a:schemeClr val="dk1"/>
+            </a:lnRef>
+            <a:fillRef idx="1">
+              <a:schemeClr val="lt1"/>
+            </a:fillRef>
+            <a:effectRef idx="0">
+              <a:schemeClr val="dk1"/>
+            </a:effectRef>
+            <a:fontRef idx="minor">
+              <a:schemeClr val="dk1"/>
+            </a:fontRef>
+          </p:style>
+          <p:txBody>
+            <a:bodyPr rtlCol="0" anchor="ctr"/>
+            <a:lstStyle/>
+            <a:p>
+              <a:pPr algn="ctr"/>
+              <a:endParaRPr lang="en-US"/>
+            </a:p>
+          </p:txBody>
+        </p:sp>
+      </p:grpSp>
+      <p:grpSp>
+        <p:nvGrpSpPr>
+          <p:cNvPr id="39" name="Group 38"/>
+          <p:cNvGrpSpPr/>
+          <p:nvPr/>
+        </p:nvGrpSpPr>
+        <p:grpSpPr>
+          <a:xfrm rot="9082740">
+            <a:off x="713176" y="3232284"/>
+            <a:ext cx="407963" cy="407963"/>
+            <a:chOff x="7188591" y="337625"/>
+            <a:chExt cx="3291840" cy="3291840"/>
+          </a:xfrm>
+        </p:grpSpPr>
+        <p:sp>
+          <p:nvSpPr>
+            <p:cNvPr id="40" name="Donut 39"/>
+            <p:cNvSpPr/>
+            <p:nvPr/>
+          </p:nvSpPr>
+          <p:spPr>
+            <a:xfrm>
+              <a:off x="7188591" y="337625"/>
+              <a:ext cx="3291840" cy="3291840"/>
+            </a:xfrm>
+            <a:prstGeom prst="donut">
+              <a:avLst>
+                <a:gd name="adj" fmla="val 12093"/>
+              </a:avLst>
+            </a:prstGeom>
+            <a:gradFill flip="none" rotWithShape="1">
+              <a:gsLst>
+                <a:gs pos="0">
+                  <a:schemeClr val="accent5">
+                    <a:lumMod val="0"/>
+                    <a:lumOff val="100000"/>
+                  </a:schemeClr>
+                </a:gs>
+                <a:gs pos="43000">
+                  <a:schemeClr val="accent5">
+                    <a:lumMod val="0"/>
+                    <a:lumOff val="100000"/>
+                  </a:schemeClr>
+                </a:gs>
+                <a:gs pos="100000">
+                  <a:schemeClr val="accent5">
+                    <a:lumMod val="100000"/>
+                  </a:schemeClr>
+                </a:gs>
+              </a:gsLst>
+              <a:path path="circle">
+                <a:fillToRect l="50000" t="50000" r="50000" b="50000"/>
+              </a:path>
+              <a:tileRect/>
+            </a:gradFill>
+          </p:spPr>
+          <p:style>
+            <a:lnRef idx="2">
+              <a:schemeClr val="accent1">
+                <a:shade val="50000"/>
+              </a:schemeClr>
+            </a:lnRef>
+            <a:fillRef idx="1">
+              <a:schemeClr val="accent1"/>
+            </a:fillRef>
+            <a:effectRef idx="0">
+              <a:schemeClr val="accent1"/>
+            </a:effectRef>
+            <a:fontRef idx="minor">
+              <a:schemeClr val="lt1"/>
+            </a:fontRef>
+          </p:style>
+          <p:txBody>
+            <a:bodyPr rtlCol="0" anchor="ctr"/>
+            <a:lstStyle/>
+            <a:p>
+              <a:pPr algn="ctr"/>
+              <a:endParaRPr lang="en-US">
+                <a:solidFill>
+                  <a:schemeClr val="tx1"/>
+                </a:solidFill>
+              </a:endParaRPr>
+            </a:p>
+          </p:txBody>
+        </p:sp>
+        <p:sp>
+          <p:nvSpPr>
+            <p:cNvPr id="41" name="Oval 40"/>
+            <p:cNvSpPr/>
+            <p:nvPr/>
+          </p:nvSpPr>
+          <p:spPr>
+            <a:xfrm>
+              <a:off x="7818480" y="962233"/>
+              <a:ext cx="2033696" cy="2042624"/>
+            </a:xfrm>
+            <a:prstGeom prst="ellipse">
+              <a:avLst/>
+            </a:prstGeom>
+          </p:spPr>
+          <p:style>
+            <a:lnRef idx="2">
+              <a:schemeClr val="dk1">
+                <a:shade val="50000"/>
+              </a:schemeClr>
+            </a:lnRef>
+            <a:fillRef idx="1">
+              <a:schemeClr val="dk1"/>
+            </a:fillRef>
+            <a:effectRef idx="0">
+              <a:schemeClr val="dk1"/>
+            </a:effectRef>
+            <a:fontRef idx="minor">
+              <a:schemeClr val="lt1"/>
+            </a:fontRef>
+          </p:style>
+          <p:txBody>
+            <a:bodyPr rtlCol="0" anchor="ctr"/>
+            <a:lstStyle/>
+            <a:p>
+              <a:pPr algn="ctr"/>
+              <a:endParaRPr lang="en-US"/>
+            </a:p>
+          </p:txBody>
+        </p:sp>
+        <p:sp>
+          <p:nvSpPr>
+            <p:cNvPr id="42" name="Rectangle 41"/>
+            <p:cNvSpPr/>
+            <p:nvPr/>
+          </p:nvSpPr>
+          <p:spPr>
+            <a:xfrm>
+              <a:off x="7976382" y="1732478"/>
+              <a:ext cx="239150" cy="490218"/>
+            </a:xfrm>
+            <a:prstGeom prst="rect">
+              <a:avLst/>
+            </a:prstGeom>
+          </p:spPr>
+          <p:style>
+            <a:lnRef idx="2">
+              <a:schemeClr val="dk1"/>
+            </a:lnRef>
+            <a:fillRef idx="1">
+              <a:schemeClr val="lt1"/>
+            </a:fillRef>
+            <a:effectRef idx="0">
+              <a:schemeClr val="dk1"/>
+            </a:effectRef>
+            <a:fontRef idx="minor">
+              <a:schemeClr val="dk1"/>
+            </a:fontRef>
+          </p:style>
+          <p:txBody>
+            <a:bodyPr rtlCol="0" anchor="ctr"/>
+            <a:lstStyle/>
+            <a:p>
+              <a:pPr algn="ctr"/>
+              <a:endParaRPr lang="en-US"/>
+            </a:p>
+          </p:txBody>
+        </p:sp>
+      </p:grpSp>
+      <mc:AlternateContent xmlns:mc="http://schemas.openxmlformats.org/markup-compatibility/2006">
+        <mc:Choice xmlns:a14="http://schemas.microsoft.com/office/drawing/2010/main" Requires="a14">
+          <p:sp>
+            <p:nvSpPr>
+              <p:cNvPr id="14" name="TextBox 13"/>
+              <p:cNvSpPr txBox="1"/>
+              <p:nvPr/>
+            </p:nvSpPr>
+            <p:spPr>
+              <a:xfrm>
+                <a:off x="857145" y="775338"/>
+                <a:ext cx="281424" cy="276999"/>
+              </a:xfrm>
+              <a:prstGeom prst="rect">
+                <a:avLst/>
+              </a:prstGeom>
+              <a:noFill/>
+            </p:spPr>
+            <p:txBody>
+              <a:bodyPr wrap="none" lIns="0" tIns="0" rIns="0" bIns="0" rtlCol="0">
+                <a:spAutoFit/>
+              </a:bodyPr>
+              <a:lstStyle/>
+              <a:p>
+                <a14:m>
+                  <m:oMathPara xmlns:m="http://schemas.openxmlformats.org/officeDocument/2006/math">
+                    <m:oMathParaPr>
+                      <m:jc m:val="centerGroup"/>
+                    </m:oMathParaPr>
+                    <m:oMath xmlns:m="http://schemas.openxmlformats.org/officeDocument/2006/math">
+                      <m:sSub>
+                        <m:sSubPr>
+                          <m:ctrlPr>
+                            <a:rPr lang="en-US" b="0" i="1" smtClean="0">
+                              <a:latin typeface="Cambria Math" panose="02040503050406030204" pitchFamily="18" charset="0"/>
+                            </a:rPr>
+                          </m:ctrlPr>
+                        </m:sSubPr>
+                        <m:e>
+                          <m:r>
+                            <a:rPr lang="en-US" b="0" i="1" smtClean="0">
+                              <a:latin typeface="Cambria Math" panose="02040503050406030204" pitchFamily="18" charset="0"/>
+                            </a:rPr>
+                            <m:t>𝑥</m:t>
+                          </m:r>
+                        </m:e>
+                        <m:sub>
+                          <m:r>
+                            <a:rPr lang="en-US" b="0" i="1" smtClean="0">
+                              <a:latin typeface="Cambria Math" panose="02040503050406030204" pitchFamily="18" charset="0"/>
+                            </a:rPr>
+                            <m:t>4</m:t>
+                          </m:r>
+                        </m:sub>
+                      </m:sSub>
+                    </m:oMath>
+                  </m:oMathPara>
+                </a14:m>
+                <a:endParaRPr lang="en-US" dirty="0"/>
+              </a:p>
+            </p:txBody>
+          </p:sp>
+        </mc:Choice>
+        <mc:Fallback>
+          <p:sp>
+            <p:nvSpPr>
+              <p:cNvPr id="14" name="TextBox 13"/>
+              <p:cNvSpPr txBox="1">
+                <a:spLocks noRot="1" noChangeAspect="1" noMove="1" noResize="1" noEditPoints="1" noAdjustHandles="1" noChangeArrowheads="1" noChangeShapeType="1" noTextEdit="1"/>
+              </p:cNvSpPr>
+              <p:nvPr/>
+            </p:nvSpPr>
+            <p:spPr>
+              <a:xfrm>
+                <a:off x="857145" y="775338"/>
+                <a:ext cx="281424" cy="276999"/>
+              </a:xfrm>
+              <a:prstGeom prst="rect">
+                <a:avLst/>
+              </a:prstGeom>
+              <a:blipFill rotWithShape="0">
+                <a:blip r:embed="rId9"/>
+                <a:stretch>
+                  <a:fillRect l="-13043" r="-6522" b="-15217"/>
+                </a:stretch>
+              </a:blipFill>
+            </p:spPr>
+            <p:txBody>
+              <a:bodyPr/>
+              <a:lstStyle/>
+              <a:p>
+                <a:r>
+                  <a:rPr lang="en-US">
+                    <a:noFill/>
+                  </a:rPr>
+                  <a:t> </a:t>
+                </a:r>
+              </a:p>
+            </p:txBody>
+          </p:sp>
+        </mc:Fallback>
+      </mc:AlternateContent>
+      <mc:AlternateContent xmlns:mc="http://schemas.openxmlformats.org/markup-compatibility/2006">
+        <mc:Choice xmlns:a14="http://schemas.microsoft.com/office/drawing/2010/main" Requires="a14">
+          <p:sp>
+            <p:nvSpPr>
+              <p:cNvPr id="43" name="TextBox 42"/>
+              <p:cNvSpPr txBox="1"/>
+              <p:nvPr/>
+            </p:nvSpPr>
+            <p:spPr>
+              <a:xfrm>
+                <a:off x="769582" y="3607786"/>
+                <a:ext cx="281423" cy="276999"/>
+              </a:xfrm>
+              <a:prstGeom prst="rect">
+                <a:avLst/>
+              </a:prstGeom>
+              <a:noFill/>
+            </p:spPr>
+            <p:txBody>
+              <a:bodyPr wrap="none" lIns="0" tIns="0" rIns="0" bIns="0" rtlCol="0">
+                <a:spAutoFit/>
+              </a:bodyPr>
+              <a:lstStyle/>
+              <a:p>
+                <a14:m>
+                  <m:oMathPara xmlns:m="http://schemas.openxmlformats.org/officeDocument/2006/math">
+                    <m:oMathParaPr>
+                      <m:jc m:val="centerGroup"/>
+                    </m:oMathParaPr>
+                    <m:oMath xmlns:m="http://schemas.openxmlformats.org/officeDocument/2006/math">
+                      <m:sSub>
+                        <m:sSubPr>
+                          <m:ctrlPr>
+                            <a:rPr lang="en-US" b="0" i="1" smtClean="0">
+                              <a:latin typeface="Cambria Math" panose="02040503050406030204" pitchFamily="18" charset="0"/>
+                            </a:rPr>
+                          </m:ctrlPr>
+                        </m:sSubPr>
+                        <m:e>
+                          <m:r>
+                            <a:rPr lang="en-US" b="0" i="1" smtClean="0">
+                              <a:latin typeface="Cambria Math" panose="02040503050406030204" pitchFamily="18" charset="0"/>
+                            </a:rPr>
+                            <m:t>𝑥</m:t>
+                          </m:r>
+                        </m:e>
+                        <m:sub>
+                          <m:r>
+                            <a:rPr lang="en-US" b="0" i="1" smtClean="0">
+                              <a:latin typeface="Cambria Math" panose="02040503050406030204" pitchFamily="18" charset="0"/>
+                            </a:rPr>
+                            <m:t>5</m:t>
+                          </m:r>
+                        </m:sub>
+                      </m:sSub>
+                    </m:oMath>
+                  </m:oMathPara>
+                </a14:m>
+                <a:endParaRPr lang="en-US" dirty="0"/>
+              </a:p>
+            </p:txBody>
+          </p:sp>
+        </mc:Choice>
+        <mc:Fallback>
+          <p:sp>
+            <p:nvSpPr>
+              <p:cNvPr id="43" name="TextBox 42"/>
+              <p:cNvSpPr txBox="1">
+                <a:spLocks noRot="1" noChangeAspect="1" noMove="1" noResize="1" noEditPoints="1" noAdjustHandles="1" noChangeArrowheads="1" noChangeShapeType="1" noTextEdit="1"/>
+              </p:cNvSpPr>
+              <p:nvPr/>
+            </p:nvSpPr>
+            <p:spPr>
+              <a:xfrm>
+                <a:off x="769582" y="3607786"/>
+                <a:ext cx="281423" cy="276999"/>
+              </a:xfrm>
+              <a:prstGeom prst="rect">
+                <a:avLst/>
+              </a:prstGeom>
+              <a:blipFill rotWithShape="0">
+                <a:blip r:embed="rId10"/>
+                <a:stretch>
+                  <a:fillRect l="-13043" r="-8696" b="-17778"/>
+                </a:stretch>
+              </a:blipFill>
+            </p:spPr>
+            <p:txBody>
+              <a:bodyPr/>
+              <a:lstStyle/>
+              <a:p>
+                <a:r>
+                  <a:rPr lang="en-US">
+                    <a:noFill/>
+                  </a:rPr>
+                  <a:t> </a:t>
+                </a:r>
+              </a:p>
+            </p:txBody>
+          </p:sp>
+        </mc:Fallback>
+      </mc:AlternateContent>
+      <p:grpSp>
+        <p:nvGrpSpPr>
+          <p:cNvPr id="44" name="Group 43"/>
+          <p:cNvGrpSpPr/>
+          <p:nvPr/>
+        </p:nvGrpSpPr>
+        <p:grpSpPr>
+          <a:xfrm rot="9082740">
+            <a:off x="1001540" y="4464672"/>
+            <a:ext cx="407963" cy="407963"/>
+            <a:chOff x="7188591" y="337625"/>
+            <a:chExt cx="3291840" cy="3291840"/>
+          </a:xfrm>
+        </p:grpSpPr>
+        <p:sp>
+          <p:nvSpPr>
+            <p:cNvPr id="45" name="Donut 44"/>
+            <p:cNvSpPr/>
+            <p:nvPr/>
+          </p:nvSpPr>
+          <p:spPr>
+            <a:xfrm>
+              <a:off x="7188591" y="337625"/>
+              <a:ext cx="3291840" cy="3291840"/>
+            </a:xfrm>
+            <a:prstGeom prst="donut">
+              <a:avLst>
+                <a:gd name="adj" fmla="val 12093"/>
+              </a:avLst>
+            </a:prstGeom>
+            <a:gradFill flip="none" rotWithShape="1">
+              <a:gsLst>
+                <a:gs pos="0">
+                  <a:schemeClr val="accent5">
+                    <a:lumMod val="0"/>
+                    <a:lumOff val="100000"/>
+                  </a:schemeClr>
+                </a:gs>
+                <a:gs pos="43000">
+                  <a:schemeClr val="accent5">
+                    <a:lumMod val="0"/>
+                    <a:lumOff val="100000"/>
+                  </a:schemeClr>
+                </a:gs>
+                <a:gs pos="100000">
+                  <a:schemeClr val="accent5">
+                    <a:lumMod val="100000"/>
+                  </a:schemeClr>
+                </a:gs>
+              </a:gsLst>
+              <a:path path="circle">
+                <a:fillToRect l="50000" t="50000" r="50000" b="50000"/>
+              </a:path>
+              <a:tileRect/>
+            </a:gradFill>
+          </p:spPr>
+          <p:style>
+            <a:lnRef idx="2">
+              <a:schemeClr val="accent1">
+                <a:shade val="50000"/>
+              </a:schemeClr>
+            </a:lnRef>
+            <a:fillRef idx="1">
+              <a:schemeClr val="accent1"/>
+            </a:fillRef>
+            <a:effectRef idx="0">
+              <a:schemeClr val="accent1"/>
+            </a:effectRef>
+            <a:fontRef idx="minor">
+              <a:schemeClr val="lt1"/>
+            </a:fontRef>
+          </p:style>
+          <p:txBody>
+            <a:bodyPr rtlCol="0" anchor="ctr"/>
+            <a:lstStyle/>
+            <a:p>
+              <a:pPr algn="ctr"/>
+              <a:endParaRPr lang="en-US">
+                <a:solidFill>
+                  <a:schemeClr val="tx1"/>
+                </a:solidFill>
+              </a:endParaRPr>
+            </a:p>
+          </p:txBody>
+        </p:sp>
+        <p:sp>
+          <p:nvSpPr>
+            <p:cNvPr id="46" name="Oval 45"/>
+            <p:cNvSpPr/>
+            <p:nvPr/>
+          </p:nvSpPr>
+          <p:spPr>
+            <a:xfrm>
+              <a:off x="7818480" y="962233"/>
+              <a:ext cx="2033696" cy="2042624"/>
+            </a:xfrm>
+            <a:prstGeom prst="ellipse">
+              <a:avLst/>
+            </a:prstGeom>
+          </p:spPr>
+          <p:style>
+            <a:lnRef idx="2">
+              <a:schemeClr val="dk1">
+                <a:shade val="50000"/>
+              </a:schemeClr>
+            </a:lnRef>
+            <a:fillRef idx="1">
+              <a:schemeClr val="dk1"/>
+            </a:fillRef>
+            <a:effectRef idx="0">
+              <a:schemeClr val="dk1"/>
+            </a:effectRef>
+            <a:fontRef idx="minor">
+              <a:schemeClr val="lt1"/>
+            </a:fontRef>
+          </p:style>
+          <p:txBody>
+            <a:bodyPr rtlCol="0" anchor="ctr"/>
+            <a:lstStyle/>
+            <a:p>
+              <a:pPr algn="ctr"/>
+              <a:endParaRPr lang="en-US"/>
+            </a:p>
+          </p:txBody>
+        </p:sp>
+        <p:sp>
+          <p:nvSpPr>
+            <p:cNvPr id="47" name="Rectangle 46"/>
+            <p:cNvSpPr/>
+            <p:nvPr/>
+          </p:nvSpPr>
+          <p:spPr>
+            <a:xfrm>
+              <a:off x="7976382" y="1732478"/>
+              <a:ext cx="239150" cy="490218"/>
+            </a:xfrm>
+            <a:prstGeom prst="rect">
+              <a:avLst/>
+            </a:prstGeom>
+          </p:spPr>
+          <p:style>
+            <a:lnRef idx="2">
+              <a:schemeClr val="dk1"/>
+            </a:lnRef>
+            <a:fillRef idx="1">
+              <a:schemeClr val="lt1"/>
+            </a:fillRef>
+            <a:effectRef idx="0">
+              <a:schemeClr val="dk1"/>
+            </a:effectRef>
+            <a:fontRef idx="minor">
+              <a:schemeClr val="dk1"/>
+            </a:fontRef>
+          </p:style>
+          <p:txBody>
+            <a:bodyPr rtlCol="0" anchor="ctr"/>
+            <a:lstStyle/>
+            <a:p>
+              <a:pPr algn="ctr"/>
+              <a:endParaRPr lang="en-US"/>
+            </a:p>
+          </p:txBody>
+        </p:sp>
+      </p:grpSp>
+      <p:grpSp>
+        <p:nvGrpSpPr>
+          <p:cNvPr id="48" name="Group 47"/>
+          <p:cNvGrpSpPr/>
+          <p:nvPr/>
+        </p:nvGrpSpPr>
+        <p:grpSpPr>
+          <a:xfrm rot="13196464">
+            <a:off x="2425786" y="4520611"/>
+            <a:ext cx="407963" cy="407963"/>
+            <a:chOff x="7188591" y="337625"/>
+            <a:chExt cx="3291840" cy="3291840"/>
+          </a:xfrm>
+        </p:grpSpPr>
+        <p:sp>
+          <p:nvSpPr>
+            <p:cNvPr id="49" name="Donut 48"/>
+            <p:cNvSpPr/>
+            <p:nvPr/>
+          </p:nvSpPr>
+          <p:spPr>
+            <a:xfrm>
+              <a:off x="7188591" y="337625"/>
+              <a:ext cx="3291840" cy="3291840"/>
+            </a:xfrm>
+            <a:prstGeom prst="donut">
+              <a:avLst>
+                <a:gd name="adj" fmla="val 12093"/>
+              </a:avLst>
+            </a:prstGeom>
+            <a:gradFill flip="none" rotWithShape="1">
+              <a:gsLst>
+                <a:gs pos="0">
+                  <a:schemeClr val="accent5">
+                    <a:lumMod val="0"/>
+                    <a:lumOff val="100000"/>
+                  </a:schemeClr>
+                </a:gs>
+                <a:gs pos="43000">
+                  <a:schemeClr val="accent5">
+                    <a:lumMod val="0"/>
+                    <a:lumOff val="100000"/>
+                  </a:schemeClr>
+                </a:gs>
+                <a:gs pos="100000">
+                  <a:schemeClr val="accent5">
+                    <a:lumMod val="100000"/>
+                  </a:schemeClr>
+                </a:gs>
+              </a:gsLst>
+              <a:path path="circle">
+                <a:fillToRect l="50000" t="50000" r="50000" b="50000"/>
+              </a:path>
+              <a:tileRect/>
+            </a:gradFill>
+          </p:spPr>
+          <p:style>
+            <a:lnRef idx="2">
+              <a:schemeClr val="accent1">
+                <a:shade val="50000"/>
+              </a:schemeClr>
+            </a:lnRef>
+            <a:fillRef idx="1">
+              <a:schemeClr val="accent1"/>
+            </a:fillRef>
+            <a:effectRef idx="0">
+              <a:schemeClr val="accent1"/>
+            </a:effectRef>
+            <a:fontRef idx="minor">
+              <a:schemeClr val="lt1"/>
+            </a:fontRef>
+          </p:style>
+          <p:txBody>
+            <a:bodyPr rtlCol="0" anchor="ctr"/>
+            <a:lstStyle/>
+            <a:p>
+              <a:pPr algn="ctr"/>
+              <a:endParaRPr lang="en-US">
+                <a:solidFill>
+                  <a:schemeClr val="tx1"/>
+                </a:solidFill>
+              </a:endParaRPr>
+            </a:p>
+          </p:txBody>
+        </p:sp>
+        <p:sp>
+          <p:nvSpPr>
+            <p:cNvPr id="50" name="Oval 49"/>
+            <p:cNvSpPr/>
+            <p:nvPr/>
+          </p:nvSpPr>
+          <p:spPr>
+            <a:xfrm>
+              <a:off x="7818480" y="962233"/>
+              <a:ext cx="2033696" cy="2042624"/>
+            </a:xfrm>
+            <a:prstGeom prst="ellipse">
+              <a:avLst/>
+            </a:prstGeom>
+          </p:spPr>
+          <p:style>
+            <a:lnRef idx="2">
+              <a:schemeClr val="dk1">
+                <a:shade val="50000"/>
+              </a:schemeClr>
+            </a:lnRef>
+            <a:fillRef idx="1">
+              <a:schemeClr val="dk1"/>
+            </a:fillRef>
+            <a:effectRef idx="0">
+              <a:schemeClr val="dk1"/>
+            </a:effectRef>
+            <a:fontRef idx="minor">
+              <a:schemeClr val="lt1"/>
+            </a:fontRef>
+          </p:style>
+          <p:txBody>
+            <a:bodyPr rtlCol="0" anchor="ctr"/>
+            <a:lstStyle/>
+            <a:p>
+              <a:pPr algn="ctr"/>
+              <a:endParaRPr lang="en-US"/>
+            </a:p>
+          </p:txBody>
+        </p:sp>
+        <p:sp>
+          <p:nvSpPr>
+            <p:cNvPr id="51" name="Rectangle 50"/>
+            <p:cNvSpPr/>
+            <p:nvPr/>
+          </p:nvSpPr>
+          <p:spPr>
+            <a:xfrm>
+              <a:off x="7976382" y="1732478"/>
+              <a:ext cx="239150" cy="490218"/>
+            </a:xfrm>
+            <a:prstGeom prst="rect">
+              <a:avLst/>
+            </a:prstGeom>
+          </p:spPr>
+          <p:style>
+            <a:lnRef idx="2">
+              <a:schemeClr val="dk1"/>
+            </a:lnRef>
+            <a:fillRef idx="1">
+              <a:schemeClr val="lt1"/>
+            </a:fillRef>
+            <a:effectRef idx="0">
+              <a:schemeClr val="dk1"/>
+            </a:effectRef>
+            <a:fontRef idx="minor">
+              <a:schemeClr val="dk1"/>
+            </a:fontRef>
+          </p:style>
+          <p:txBody>
+            <a:bodyPr rtlCol="0" anchor="ctr"/>
+            <a:lstStyle/>
+            <a:p>
+              <a:pPr algn="ctr"/>
+              <a:endParaRPr lang="en-US"/>
+            </a:p>
+          </p:txBody>
+        </p:sp>
+      </p:grpSp>
+      <p:grpSp>
+        <p:nvGrpSpPr>
+          <p:cNvPr id="52" name="Group 51"/>
+          <p:cNvGrpSpPr/>
+          <p:nvPr/>
+        </p:nvGrpSpPr>
+        <p:grpSpPr>
+          <a:xfrm rot="9082740">
+            <a:off x="1752121" y="4187905"/>
+            <a:ext cx="407963" cy="407963"/>
+            <a:chOff x="7188591" y="337625"/>
+            <a:chExt cx="3291840" cy="3291840"/>
+          </a:xfrm>
+        </p:grpSpPr>
+        <p:sp>
+          <p:nvSpPr>
+            <p:cNvPr id="53" name="Donut 52"/>
+            <p:cNvSpPr/>
+            <p:nvPr/>
+          </p:nvSpPr>
+          <p:spPr>
+            <a:xfrm>
+              <a:off x="7188591" y="337625"/>
+              <a:ext cx="3291840" cy="3291840"/>
+            </a:xfrm>
+            <a:prstGeom prst="donut">
+              <a:avLst>
+                <a:gd name="adj" fmla="val 12093"/>
+              </a:avLst>
+            </a:prstGeom>
+            <a:gradFill flip="none" rotWithShape="1">
+              <a:gsLst>
+                <a:gs pos="0">
+                  <a:schemeClr val="accent5">
+                    <a:lumMod val="0"/>
+                    <a:lumOff val="100000"/>
+                  </a:schemeClr>
+                </a:gs>
+                <a:gs pos="43000">
+                  <a:schemeClr val="accent5">
+                    <a:lumMod val="0"/>
+                    <a:lumOff val="100000"/>
+                  </a:schemeClr>
+                </a:gs>
+                <a:gs pos="100000">
+                  <a:schemeClr val="accent5">
+                    <a:lumMod val="100000"/>
+                  </a:schemeClr>
+                </a:gs>
+              </a:gsLst>
+              <a:path path="circle">
+                <a:fillToRect l="50000" t="50000" r="50000" b="50000"/>
+              </a:path>
+              <a:tileRect/>
+            </a:gradFill>
+          </p:spPr>
+          <p:style>
+            <a:lnRef idx="2">
+              <a:schemeClr val="accent1">
+                <a:shade val="50000"/>
+              </a:schemeClr>
+            </a:lnRef>
+            <a:fillRef idx="1">
+              <a:schemeClr val="accent1"/>
+            </a:fillRef>
+            <a:effectRef idx="0">
+              <a:schemeClr val="accent1"/>
+            </a:effectRef>
+            <a:fontRef idx="minor">
+              <a:schemeClr val="lt1"/>
+            </a:fontRef>
+          </p:style>
+          <p:txBody>
+            <a:bodyPr rtlCol="0" anchor="ctr"/>
+            <a:lstStyle/>
+            <a:p>
+              <a:pPr algn="ctr"/>
+              <a:endParaRPr lang="en-US">
+                <a:solidFill>
+                  <a:schemeClr val="tx1"/>
+                </a:solidFill>
+              </a:endParaRPr>
+            </a:p>
+          </p:txBody>
+        </p:sp>
+        <p:sp>
+          <p:nvSpPr>
+            <p:cNvPr id="54" name="Oval 53"/>
+            <p:cNvSpPr/>
+            <p:nvPr/>
+          </p:nvSpPr>
+          <p:spPr>
+            <a:xfrm>
+              <a:off x="7818480" y="962233"/>
+              <a:ext cx="2033696" cy="2042624"/>
+            </a:xfrm>
+            <a:prstGeom prst="ellipse">
+              <a:avLst/>
+            </a:prstGeom>
+          </p:spPr>
+          <p:style>
+            <a:lnRef idx="2">
+              <a:schemeClr val="dk1">
+                <a:shade val="50000"/>
+              </a:schemeClr>
+            </a:lnRef>
+            <a:fillRef idx="1">
+              <a:schemeClr val="dk1"/>
+            </a:fillRef>
+            <a:effectRef idx="0">
+              <a:schemeClr val="dk1"/>
+            </a:effectRef>
+            <a:fontRef idx="minor">
+              <a:schemeClr val="lt1"/>
+            </a:fontRef>
+          </p:style>
+          <p:txBody>
+            <a:bodyPr rtlCol="0" anchor="ctr"/>
+            <a:lstStyle/>
+            <a:p>
+              <a:pPr algn="ctr"/>
+              <a:endParaRPr lang="en-US"/>
+            </a:p>
+          </p:txBody>
+        </p:sp>
+        <p:sp>
+          <p:nvSpPr>
+            <p:cNvPr id="55" name="Rectangle 54"/>
+            <p:cNvSpPr/>
+            <p:nvPr/>
+          </p:nvSpPr>
+          <p:spPr>
+            <a:xfrm>
+              <a:off x="7976382" y="1732478"/>
+              <a:ext cx="239150" cy="490218"/>
+            </a:xfrm>
+            <a:prstGeom prst="rect">
+              <a:avLst/>
+            </a:prstGeom>
+          </p:spPr>
+          <p:style>
+            <a:lnRef idx="2">
+              <a:schemeClr val="dk1"/>
+            </a:lnRef>
+            <a:fillRef idx="1">
+              <a:schemeClr val="lt1"/>
+            </a:fillRef>
+            <a:effectRef idx="0">
+              <a:schemeClr val="dk1"/>
+            </a:effectRef>
+            <a:fontRef idx="minor">
+              <a:schemeClr val="dk1"/>
+            </a:fontRef>
+          </p:style>
+          <p:txBody>
+            <a:bodyPr rtlCol="0" anchor="ctr"/>
+            <a:lstStyle/>
+            <a:p>
+              <a:pPr algn="ctr"/>
+              <a:endParaRPr lang="en-US"/>
+            </a:p>
+          </p:txBody>
+        </p:sp>
+      </p:grpSp>
+      <p:grpSp>
+        <p:nvGrpSpPr>
+          <p:cNvPr id="56" name="Group 55"/>
+          <p:cNvGrpSpPr/>
+          <p:nvPr/>
+        </p:nvGrpSpPr>
+        <p:grpSpPr>
+          <a:xfrm rot="16617234">
+            <a:off x="240521" y="1560374"/>
+            <a:ext cx="407963" cy="407963"/>
+            <a:chOff x="7188591" y="337625"/>
+            <a:chExt cx="3291840" cy="3291840"/>
+          </a:xfrm>
+        </p:grpSpPr>
+        <p:sp>
+          <p:nvSpPr>
+            <p:cNvPr id="57" name="Donut 56"/>
+            <p:cNvSpPr/>
+            <p:nvPr/>
+          </p:nvSpPr>
+          <p:spPr>
+            <a:xfrm>
+              <a:off x="7188591" y="337625"/>
+              <a:ext cx="3291840" cy="3291840"/>
+            </a:xfrm>
+            <a:prstGeom prst="donut">
+              <a:avLst>
+                <a:gd name="adj" fmla="val 12093"/>
+              </a:avLst>
+            </a:prstGeom>
+            <a:gradFill flip="none" rotWithShape="1">
+              <a:gsLst>
+                <a:gs pos="0">
+                  <a:schemeClr val="accent5">
+                    <a:lumMod val="0"/>
+                    <a:lumOff val="100000"/>
+                  </a:schemeClr>
+                </a:gs>
+                <a:gs pos="43000">
+                  <a:schemeClr val="accent5">
+                    <a:lumMod val="0"/>
+                    <a:lumOff val="100000"/>
+                  </a:schemeClr>
+                </a:gs>
+                <a:gs pos="100000">
+                  <a:schemeClr val="accent5">
+                    <a:lumMod val="100000"/>
+                  </a:schemeClr>
+                </a:gs>
+              </a:gsLst>
+              <a:path path="circle">
+                <a:fillToRect l="50000" t="50000" r="50000" b="50000"/>
+              </a:path>
+              <a:tileRect/>
+            </a:gradFill>
+          </p:spPr>
+          <p:style>
+            <a:lnRef idx="2">
+              <a:schemeClr val="accent1">
+                <a:shade val="50000"/>
+              </a:schemeClr>
+            </a:lnRef>
+            <a:fillRef idx="1">
+              <a:schemeClr val="accent1"/>
+            </a:fillRef>
+            <a:effectRef idx="0">
+              <a:schemeClr val="accent1"/>
+            </a:effectRef>
+            <a:fontRef idx="minor">
+              <a:schemeClr val="lt1"/>
+            </a:fontRef>
+          </p:style>
+          <p:txBody>
+            <a:bodyPr rtlCol="0" anchor="ctr"/>
+            <a:lstStyle/>
+            <a:p>
+              <a:pPr algn="ctr"/>
+              <a:endParaRPr lang="en-US">
+                <a:solidFill>
+                  <a:schemeClr val="tx1"/>
+                </a:solidFill>
+              </a:endParaRPr>
+            </a:p>
+          </p:txBody>
+        </p:sp>
+        <p:sp>
+          <p:nvSpPr>
+            <p:cNvPr id="58" name="Oval 57"/>
+            <p:cNvSpPr/>
+            <p:nvPr/>
+          </p:nvSpPr>
+          <p:spPr>
+            <a:xfrm>
+              <a:off x="7818480" y="962233"/>
+              <a:ext cx="2033696" cy="2042624"/>
+            </a:xfrm>
+            <a:prstGeom prst="ellipse">
+              <a:avLst/>
+            </a:prstGeom>
+          </p:spPr>
+          <p:style>
+            <a:lnRef idx="2">
+              <a:schemeClr val="dk1">
+                <a:shade val="50000"/>
+              </a:schemeClr>
+            </a:lnRef>
+            <a:fillRef idx="1">
+              <a:schemeClr val="dk1"/>
+            </a:fillRef>
+            <a:effectRef idx="0">
+              <a:schemeClr val="dk1"/>
+            </a:effectRef>
+            <a:fontRef idx="minor">
+              <a:schemeClr val="lt1"/>
+            </a:fontRef>
+          </p:style>
+          <p:txBody>
+            <a:bodyPr rtlCol="0" anchor="ctr"/>
+            <a:lstStyle/>
+            <a:p>
+              <a:pPr algn="ctr"/>
+              <a:endParaRPr lang="en-US"/>
+            </a:p>
+          </p:txBody>
+        </p:sp>
+        <p:sp>
+          <p:nvSpPr>
+            <p:cNvPr id="59" name="Rectangle 58"/>
+            <p:cNvSpPr/>
+            <p:nvPr/>
+          </p:nvSpPr>
+          <p:spPr>
+            <a:xfrm>
+              <a:off x="7976382" y="1732478"/>
+              <a:ext cx="239150" cy="490218"/>
+            </a:xfrm>
+            <a:prstGeom prst="rect">
+              <a:avLst/>
+            </a:prstGeom>
+          </p:spPr>
+          <p:style>
+            <a:lnRef idx="2">
+              <a:schemeClr val="dk1"/>
+            </a:lnRef>
+            <a:fillRef idx="1">
+              <a:schemeClr val="lt1"/>
+            </a:fillRef>
+            <a:effectRef idx="0">
+              <a:schemeClr val="dk1"/>
+            </a:effectRef>
+            <a:fontRef idx="minor">
+              <a:schemeClr val="dk1"/>
+            </a:fontRef>
+          </p:style>
+          <p:txBody>
+            <a:bodyPr rtlCol="0" anchor="ctr"/>
+            <a:lstStyle/>
+            <a:p>
+              <a:pPr algn="ctr"/>
+              <a:endParaRPr lang="en-US"/>
+            </a:p>
+          </p:txBody>
+        </p:sp>
+      </p:grpSp>
+      <p:grpSp>
+        <p:nvGrpSpPr>
+          <p:cNvPr id="60" name="Group 59"/>
+          <p:cNvGrpSpPr/>
+          <p:nvPr/>
+        </p:nvGrpSpPr>
+        <p:grpSpPr>
+          <a:xfrm rot="9082740">
+            <a:off x="4503658" y="3310124"/>
+            <a:ext cx="407963" cy="407963"/>
+            <a:chOff x="7188591" y="337625"/>
+            <a:chExt cx="3291840" cy="3291840"/>
+          </a:xfrm>
+        </p:grpSpPr>
+        <p:sp>
+          <p:nvSpPr>
+            <p:cNvPr id="61" name="Donut 60"/>
+            <p:cNvSpPr/>
+            <p:nvPr/>
+          </p:nvSpPr>
+          <p:spPr>
+            <a:xfrm>
+              <a:off x="7188591" y="337625"/>
+              <a:ext cx="3291840" cy="3291840"/>
+            </a:xfrm>
+            <a:prstGeom prst="donut">
+              <a:avLst>
+                <a:gd name="adj" fmla="val 12093"/>
+              </a:avLst>
+            </a:prstGeom>
+            <a:gradFill flip="none" rotWithShape="1">
+              <a:gsLst>
+                <a:gs pos="0">
+                  <a:schemeClr val="accent5">
+                    <a:lumMod val="0"/>
+                    <a:lumOff val="100000"/>
+                  </a:schemeClr>
+                </a:gs>
+                <a:gs pos="43000">
+                  <a:schemeClr val="accent5">
+                    <a:lumMod val="0"/>
+                    <a:lumOff val="100000"/>
+                  </a:schemeClr>
+                </a:gs>
+                <a:gs pos="100000">
+                  <a:schemeClr val="accent5">
+                    <a:lumMod val="100000"/>
+                  </a:schemeClr>
+                </a:gs>
+              </a:gsLst>
+              <a:path path="circle">
+                <a:fillToRect l="50000" t="50000" r="50000" b="50000"/>
+              </a:path>
+              <a:tileRect/>
+            </a:gradFill>
+          </p:spPr>
+          <p:style>
+            <a:lnRef idx="2">
+              <a:schemeClr val="accent1">
+                <a:shade val="50000"/>
+              </a:schemeClr>
+            </a:lnRef>
+            <a:fillRef idx="1">
+              <a:schemeClr val="accent1"/>
+            </a:fillRef>
+            <a:effectRef idx="0">
+              <a:schemeClr val="accent1"/>
+            </a:effectRef>
+            <a:fontRef idx="minor">
+              <a:schemeClr val="lt1"/>
+            </a:fontRef>
+          </p:style>
+          <p:txBody>
+            <a:bodyPr rtlCol="0" anchor="ctr"/>
+            <a:lstStyle/>
+            <a:p>
+              <a:pPr algn="ctr"/>
+              <a:endParaRPr lang="en-US">
+                <a:solidFill>
+                  <a:schemeClr val="tx1"/>
+                </a:solidFill>
+              </a:endParaRPr>
+            </a:p>
+          </p:txBody>
+        </p:sp>
+        <p:sp>
+          <p:nvSpPr>
+            <p:cNvPr id="62" name="Oval 61"/>
+            <p:cNvSpPr/>
+            <p:nvPr/>
+          </p:nvSpPr>
+          <p:spPr>
+            <a:xfrm>
+              <a:off x="7818480" y="962233"/>
+              <a:ext cx="2033696" cy="2042624"/>
+            </a:xfrm>
+            <a:prstGeom prst="ellipse">
+              <a:avLst/>
+            </a:prstGeom>
+          </p:spPr>
+          <p:style>
+            <a:lnRef idx="2">
+              <a:schemeClr val="dk1">
+                <a:shade val="50000"/>
+              </a:schemeClr>
+            </a:lnRef>
+            <a:fillRef idx="1">
+              <a:schemeClr val="dk1"/>
+            </a:fillRef>
+            <a:effectRef idx="0">
+              <a:schemeClr val="dk1"/>
+            </a:effectRef>
+            <a:fontRef idx="minor">
+              <a:schemeClr val="lt1"/>
+            </a:fontRef>
+          </p:style>
+          <p:txBody>
+            <a:bodyPr rtlCol="0" anchor="ctr"/>
+            <a:lstStyle/>
+            <a:p>
+              <a:pPr algn="ctr"/>
+              <a:endParaRPr lang="en-US"/>
+            </a:p>
+          </p:txBody>
+        </p:sp>
+        <p:sp>
+          <p:nvSpPr>
+            <p:cNvPr id="63" name="Rectangle 62"/>
+            <p:cNvSpPr/>
+            <p:nvPr/>
+          </p:nvSpPr>
+          <p:spPr>
+            <a:xfrm>
+              <a:off x="7976382" y="1732478"/>
+              <a:ext cx="239150" cy="490218"/>
+            </a:xfrm>
+            <a:prstGeom prst="rect">
+              <a:avLst/>
+            </a:prstGeom>
+          </p:spPr>
+          <p:style>
+            <a:lnRef idx="2">
+              <a:schemeClr val="dk1"/>
+            </a:lnRef>
+            <a:fillRef idx="1">
+              <a:schemeClr val="lt1"/>
+            </a:fillRef>
+            <a:effectRef idx="0">
+              <a:schemeClr val="dk1"/>
+            </a:effectRef>
+            <a:fontRef idx="minor">
+              <a:schemeClr val="dk1"/>
+            </a:fontRef>
+          </p:style>
+          <p:txBody>
+            <a:bodyPr rtlCol="0" anchor="ctr"/>
+            <a:lstStyle/>
+            <a:p>
+              <a:pPr algn="ctr"/>
+              <a:endParaRPr lang="en-US"/>
+            </a:p>
+          </p:txBody>
+        </p:sp>
+      </p:grpSp>
+      <p:sp>
+        <p:nvSpPr>
+          <p:cNvPr id="64" name="TextBox 63"/>
+          <p:cNvSpPr txBox="1"/>
+          <p:nvPr/>
+        </p:nvSpPr>
+        <p:spPr>
+          <a:xfrm>
+            <a:off x="1307305" y="2283914"/>
+            <a:ext cx="662104" cy="461665"/>
+          </a:xfrm>
+          <a:prstGeom prst="rect">
+            <a:avLst/>
+          </a:prstGeom>
+          <a:noFill/>
+        </p:spPr>
+        <p:txBody>
+          <a:bodyPr wrap="none" rtlCol="0">
+            <a:spAutoFit/>
+          </a:bodyPr>
+          <a:lstStyle/>
+          <a:p>
+            <a:r>
+              <a:rPr lang="en-US" sz="2400" b="1" dirty="0" smtClean="0">
+                <a:solidFill>
+                  <a:schemeClr val="bg1"/>
+                </a:solidFill>
+              </a:rPr>
+              <a:t>Fire</a:t>
+            </a:r>
+            <a:endParaRPr lang="en-US" sz="2400" b="1" dirty="0">
+              <a:solidFill>
+                <a:schemeClr val="bg1"/>
+              </a:solidFill>
+            </a:endParaRPr>
+          </a:p>
+        </p:txBody>
+      </p:sp>
+      <p:sp>
+        <p:nvSpPr>
+          <p:cNvPr id="65" name="TextBox 64"/>
+          <p:cNvSpPr txBox="1"/>
+          <p:nvPr/>
+        </p:nvSpPr>
+        <p:spPr>
+          <a:xfrm>
+            <a:off x="431429" y="3995664"/>
+            <a:ext cx="852285" cy="369332"/>
+          </a:xfrm>
+          <a:prstGeom prst="rect">
+            <a:avLst/>
+          </a:prstGeom>
+          <a:noFill/>
+        </p:spPr>
+        <p:txBody>
+          <a:bodyPr wrap="none" rtlCol="0">
+            <a:spAutoFit/>
+          </a:bodyPr>
+          <a:lstStyle/>
+          <a:p>
+            <a:r>
+              <a:rPr lang="en-US" b="1" dirty="0" smtClean="0"/>
+              <a:t>Robots</a:t>
+            </a:r>
+            <a:endParaRPr lang="en-US" b="1" dirty="0"/>
+          </a:p>
+        </p:txBody>
+      </p:sp>
+      <p:cxnSp>
+        <p:nvCxnSpPr>
+          <p:cNvPr id="67" name="Straight Arrow Connector 66"/>
+          <p:cNvCxnSpPr>
+            <a:endCxn id="45" idx="4"/>
+          </p:cNvCxnSpPr>
+          <p:nvPr/>
+        </p:nvCxnSpPr>
+        <p:spPr>
+          <a:xfrm>
+            <a:off x="1025417" y="4314927"/>
+            <a:ext cx="82394" cy="174670"/>
+          </a:xfrm>
+          <a:prstGeom prst="straightConnector1">
+            <a:avLst/>
+          </a:prstGeom>
+          <a:ln>
+            <a:tailEnd type="triangle"/>
+          </a:ln>
+        </p:spPr>
+        <p:style>
+          <a:lnRef idx="3">
+            <a:schemeClr val="dk1"/>
+          </a:lnRef>
+          <a:fillRef idx="0">
+            <a:schemeClr val="dk1"/>
+          </a:fillRef>
+          <a:effectRef idx="2">
+            <a:schemeClr val="dk1"/>
+          </a:effectRef>
+          <a:fontRef idx="minor">
+            <a:schemeClr val="tx1"/>
+          </a:fontRef>
+        </p:style>
+      </p:cxnSp>
+      <p:cxnSp>
+        <p:nvCxnSpPr>
+          <p:cNvPr id="74" name="Straight Arrow Connector 73"/>
+          <p:cNvCxnSpPr>
+            <a:stCxn id="65" idx="3"/>
+            <a:endCxn id="53" idx="5"/>
+          </p:cNvCxnSpPr>
+          <p:nvPr/>
+        </p:nvCxnSpPr>
+        <p:spPr>
+          <a:xfrm>
+            <a:off x="1283714" y="4180330"/>
+            <a:ext cx="476685" cy="154036"/>
+          </a:xfrm>
+          <a:prstGeom prst="straightConnector1">
+            <a:avLst/>
+          </a:prstGeom>
+          <a:ln>
+            <a:tailEnd type="triangle"/>
+          </a:ln>
+        </p:spPr>
+        <p:style>
+          <a:lnRef idx="3">
+            <a:schemeClr val="dk1"/>
+          </a:lnRef>
+          <a:fillRef idx="0">
+            <a:schemeClr val="dk1"/>
+          </a:fillRef>
+          <a:effectRef idx="2">
+            <a:schemeClr val="dk1"/>
+          </a:effectRef>
+          <a:fontRef idx="minor">
+            <a:schemeClr val="tx1"/>
+          </a:fontRef>
+        </p:style>
+      </p:cxnSp>
     </p:spTree>
     <p:extLst>
       <p:ext uri="{BB962C8B-B14F-4D97-AF65-F5344CB8AC3E}">

</xml_diff>

<commit_message>
reorganized the figure in the paper and extened related works some more.
</commit_message>
<xml_diff>
--- a/figures/GlobalGameSetup.pptx
+++ b/figures/GlobalGameSetup.pptx
@@ -6,6 +6,7 @@
   </p:sldMasterIdLst>
   <p:sldIdLst>
     <p:sldId id="256" r:id="rId2"/>
+    <p:sldId id="257" r:id="rId3"/>
   </p:sldIdLst>
   <p:sldSz cx="12192000" cy="6858000"/>
   <p:notesSz cx="6858000" cy="9144000"/>
@@ -2969,8 +2970,8 @@
           <a:chExt cx="0" cy="0"/>
         </a:xfrm>
       </p:grpSpPr>
-      <mc:AlternateContent xmlns:mc="http://schemas.openxmlformats.org/markup-compatibility/2006">
-        <mc:Choice xmlns:a14="http://schemas.microsoft.com/office/drawing/2010/main" Requires="a14">
+      <mc:AlternateContent xmlns:mc="http://schemas.openxmlformats.org/markup-compatibility/2006" xmlns:a14="http://schemas.microsoft.com/office/drawing/2010/main">
+        <mc:Choice Requires="a14">
           <p:sp>
             <p:nvSpPr>
               <p:cNvPr id="5" name="Oval 4"/>
@@ -3052,7 +3053,7 @@
             </p:txBody>
           </p:sp>
         </mc:Choice>
-        <mc:Fallback>
+        <mc:Fallback xmlns="">
           <p:sp>
             <p:nvSpPr>
               <p:cNvPr id="5" name="Oval 4"/>
@@ -3213,8 +3214,8 @@
           </a:fontRef>
         </p:style>
       </p:cxnSp>
-      <mc:AlternateContent xmlns:mc="http://schemas.openxmlformats.org/markup-compatibility/2006">
-        <mc:Choice xmlns:a14="http://schemas.microsoft.com/office/drawing/2010/main" Requires="a14">
+      <mc:AlternateContent xmlns:mc="http://schemas.openxmlformats.org/markup-compatibility/2006" xmlns:a14="http://schemas.microsoft.com/office/drawing/2010/main">
+        <mc:Choice Requires="a14">
           <p:sp>
             <p:nvSpPr>
               <p:cNvPr id="16" name="TextBox 15"/>
@@ -3299,7 +3300,7 @@
             </p:txBody>
           </p:sp>
         </mc:Choice>
-        <mc:Fallback>
+        <mc:Fallback xmlns="">
           <p:sp>
             <p:nvSpPr>
               <p:cNvPr id="16" name="TextBox 15"/>
@@ -3338,8 +3339,8 @@
           </p:sp>
         </mc:Fallback>
       </mc:AlternateContent>
-      <mc:AlternateContent xmlns:mc="http://schemas.openxmlformats.org/markup-compatibility/2006">
-        <mc:Choice xmlns:a14="http://schemas.microsoft.com/office/drawing/2010/main" Requires="a14">
+      <mc:AlternateContent xmlns:mc="http://schemas.openxmlformats.org/markup-compatibility/2006" xmlns:a14="http://schemas.microsoft.com/office/drawing/2010/main">
+        <mc:Choice Requires="a14">
           <p:sp>
             <p:nvSpPr>
               <p:cNvPr id="17" name="TextBox 16"/>
@@ -3445,7 +3446,7 @@
             </p:txBody>
           </p:sp>
         </mc:Choice>
-        <mc:Fallback>
+        <mc:Fallback xmlns="">
           <p:sp>
             <p:nvSpPr>
               <p:cNvPr id="17" name="TextBox 16"/>
@@ -3976,8 +3977,8 @@
           </p:txBody>
         </p:sp>
       </p:grpSp>
-      <mc:AlternateContent xmlns:mc="http://schemas.openxmlformats.org/markup-compatibility/2006">
-        <mc:Choice xmlns:a14="http://schemas.microsoft.com/office/drawing/2010/main" Requires="a14">
+      <mc:AlternateContent xmlns:mc="http://schemas.openxmlformats.org/markup-compatibility/2006" xmlns:a14="http://schemas.microsoft.com/office/drawing/2010/main">
+        <mc:Choice Requires="a14">
           <p:sp>
             <p:nvSpPr>
               <p:cNvPr id="30" name="TextBox 29"/>
@@ -4062,7 +4063,7 @@
             </p:txBody>
           </p:sp>
         </mc:Choice>
-        <mc:Fallback>
+        <mc:Fallback xmlns="">
           <p:sp>
             <p:nvSpPr>
               <p:cNvPr id="30" name="TextBox 29"/>
@@ -4101,8 +4102,8 @@
           </p:sp>
         </mc:Fallback>
       </mc:AlternateContent>
-      <mc:AlternateContent xmlns:mc="http://schemas.openxmlformats.org/markup-compatibility/2006">
-        <mc:Choice xmlns:a14="http://schemas.microsoft.com/office/drawing/2010/main" Requires="a14">
+      <mc:AlternateContent xmlns:mc="http://schemas.openxmlformats.org/markup-compatibility/2006" xmlns:a14="http://schemas.microsoft.com/office/drawing/2010/main">
+        <mc:Choice Requires="a14">
           <p:sp>
             <p:nvSpPr>
               <p:cNvPr id="31" name="TextBox 30"/>
@@ -4187,7 +4188,7 @@
             </p:txBody>
           </p:sp>
         </mc:Choice>
-        <mc:Fallback>
+        <mc:Fallback xmlns="">
           <p:sp>
             <p:nvSpPr>
               <p:cNvPr id="31" name="TextBox 30"/>
@@ -4226,8 +4227,8 @@
           </p:sp>
         </mc:Fallback>
       </mc:AlternateContent>
-      <mc:AlternateContent xmlns:mc="http://schemas.openxmlformats.org/markup-compatibility/2006">
-        <mc:Choice xmlns:a14="http://schemas.microsoft.com/office/drawing/2010/main" Requires="a14">
+      <mc:AlternateContent xmlns:mc="http://schemas.openxmlformats.org/markup-compatibility/2006" xmlns:a14="http://schemas.microsoft.com/office/drawing/2010/main">
+        <mc:Choice Requires="a14">
           <p:sp>
             <p:nvSpPr>
               <p:cNvPr id="33" name="TextBox 32"/>
@@ -4333,7 +4334,7 @@
             </p:txBody>
           </p:sp>
         </mc:Choice>
-        <mc:Fallback>
+        <mc:Fallback xmlns="">
           <p:sp>
             <p:nvSpPr>
               <p:cNvPr id="33" name="TextBox 32"/>
@@ -4372,8 +4373,8 @@
           </p:sp>
         </mc:Fallback>
       </mc:AlternateContent>
-      <mc:AlternateContent xmlns:mc="http://schemas.openxmlformats.org/markup-compatibility/2006">
-        <mc:Choice xmlns:a14="http://schemas.microsoft.com/office/drawing/2010/main" Requires="a14">
+      <mc:AlternateContent xmlns:mc="http://schemas.openxmlformats.org/markup-compatibility/2006" xmlns:a14="http://schemas.microsoft.com/office/drawing/2010/main">
+        <mc:Choice Requires="a14">
           <p:sp>
             <p:nvSpPr>
               <p:cNvPr id="34" name="TextBox 33"/>
@@ -4479,7 +4480,7 @@
             </p:txBody>
           </p:sp>
         </mc:Choice>
-        <mc:Fallback>
+        <mc:Fallback xmlns="">
           <p:sp>
             <p:nvSpPr>
               <p:cNvPr id="34" name="TextBox 33"/>
@@ -4846,8 +4847,8 @@
           </p:txBody>
         </p:sp>
       </p:grpSp>
-      <mc:AlternateContent xmlns:mc="http://schemas.openxmlformats.org/markup-compatibility/2006">
-        <mc:Choice xmlns:a14="http://schemas.microsoft.com/office/drawing/2010/main" Requires="a14">
+      <mc:AlternateContent xmlns:mc="http://schemas.openxmlformats.org/markup-compatibility/2006" xmlns:a14="http://schemas.microsoft.com/office/drawing/2010/main">
+        <mc:Choice Requires="a14">
           <p:sp>
             <p:nvSpPr>
               <p:cNvPr id="14" name="TextBox 13"/>
@@ -4870,6 +4871,7 @@
               </a:bodyPr>
               <a:lstStyle/>
               <a:p>
+                <a:pPr/>
                 <a14:m>
                   <m:oMathPara xmlns:m="http://schemas.openxmlformats.org/officeDocument/2006/math">
                     <m:oMathParaPr>
@@ -4909,7 +4911,7 @@
             </p:txBody>
           </p:sp>
         </mc:Choice>
-        <mc:Fallback>
+        <mc:Fallback xmlns="">
           <p:sp>
             <p:nvSpPr>
               <p:cNvPr id="14" name="TextBox 13"/>
@@ -4948,8 +4950,8 @@
           </p:sp>
         </mc:Fallback>
       </mc:AlternateContent>
-      <mc:AlternateContent xmlns:mc="http://schemas.openxmlformats.org/markup-compatibility/2006">
-        <mc:Choice xmlns:a14="http://schemas.microsoft.com/office/drawing/2010/main" Requires="a14">
+      <mc:AlternateContent xmlns:mc="http://schemas.openxmlformats.org/markup-compatibility/2006" xmlns:a14="http://schemas.microsoft.com/office/drawing/2010/main">
+        <mc:Choice Requires="a14">
           <p:sp>
             <p:nvSpPr>
               <p:cNvPr id="43" name="TextBox 42"/>
@@ -4972,6 +4974,7 @@
               </a:bodyPr>
               <a:lstStyle/>
               <a:p>
+                <a:pPr/>
                 <a14:m>
                   <m:oMathPara xmlns:m="http://schemas.openxmlformats.org/officeDocument/2006/math">
                     <m:oMathParaPr>
@@ -5011,7 +5014,7 @@
             </p:txBody>
           </p:sp>
         </mc:Choice>
-        <mc:Fallback>
+        <mc:Fallback xmlns="">
           <p:sp>
             <p:nvSpPr>
               <p:cNvPr id="43" name="TextBox 42"/>
@@ -6022,6 +6025,610 @@
 </p:sld>
 </file>
 
+<file path=ppt/slides/slide2.xml><?xml version="1.0" encoding="utf-8"?>
+<p:sld xmlns:a="http://schemas.openxmlformats.org/drawingml/2006/main" xmlns:r="http://schemas.openxmlformats.org/officeDocument/2006/relationships" xmlns:p="http://schemas.openxmlformats.org/presentationml/2006/main">
+  <p:cSld>
+    <p:spTree>
+      <p:nvGrpSpPr>
+        <p:cNvPr id="1" name=""/>
+        <p:cNvGrpSpPr/>
+        <p:nvPr/>
+      </p:nvGrpSpPr>
+      <p:grpSpPr>
+        <a:xfrm>
+          <a:off x="0" y="0"/>
+          <a:ext cx="0" cy="0"/>
+          <a:chOff x="0" y="0"/>
+          <a:chExt cx="0" cy="0"/>
+        </a:xfrm>
+      </p:grpSpPr>
+      <p:pic>
+        <p:nvPicPr>
+          <p:cNvPr id="4" name="Picture 3"/>
+          <p:cNvPicPr>
+            <a:picLocks noChangeAspect="1"/>
+          </p:cNvPicPr>
+          <p:nvPr/>
+        </p:nvPicPr>
+        <p:blipFill>
+          <a:blip r:embed="rId2"/>
+          <a:stretch>
+            <a:fillRect/>
+          </a:stretch>
+        </p:blipFill>
+        <p:spPr>
+          <a:xfrm>
+            <a:off x="291238" y="1776619"/>
+            <a:ext cx="11609524" cy="3304762"/>
+          </a:xfrm>
+          <a:prstGeom prst="rect">
+            <a:avLst/>
+          </a:prstGeom>
+        </p:spPr>
+      </p:pic>
+      <mc:AlternateContent xmlns:mc="http://schemas.openxmlformats.org/markup-compatibility/2006">
+        <mc:Choice xmlns:a14="http://schemas.microsoft.com/office/drawing/2010/main" Requires="a14">
+          <p:sp>
+            <p:nvSpPr>
+              <p:cNvPr id="5" name="TextBox 4"/>
+              <p:cNvSpPr txBox="1"/>
+              <p:nvPr/>
+            </p:nvSpPr>
+            <p:spPr>
+              <a:xfrm>
+                <a:off x="6633882" y="3090446"/>
+                <a:ext cx="434799" cy="738664"/>
+              </a:xfrm>
+              <a:prstGeom prst="rect">
+                <a:avLst/>
+              </a:prstGeom>
+              <a:noFill/>
+            </p:spPr>
+            <p:txBody>
+              <a:bodyPr wrap="none" lIns="0" tIns="0" rIns="0" bIns="0" rtlCol="0">
+                <a:spAutoFit/>
+              </a:bodyPr>
+              <a:lstStyle/>
+              <a:p>
+                <a14:m>
+                  <m:oMathPara xmlns:m="http://schemas.openxmlformats.org/officeDocument/2006/math">
+                    <m:oMathParaPr>
+                      <m:jc m:val="centerGroup"/>
+                    </m:oMathParaPr>
+                    <m:oMath xmlns:m="http://schemas.openxmlformats.org/officeDocument/2006/math">
+                      <m:r>
+                        <a:rPr lang="en-US" sz="4800" b="0" i="1" smtClean="0">
+                          <a:solidFill>
+                            <a:schemeClr val="bg1"/>
+                          </a:solidFill>
+                          <a:latin typeface="Cambria Math" panose="02040503050406030204" pitchFamily="18" charset="0"/>
+                        </a:rPr>
+                        <m:t>𝜏</m:t>
+                      </m:r>
+                    </m:oMath>
+                  </m:oMathPara>
+                </a14:m>
+                <a:endParaRPr lang="en-US" sz="4800" dirty="0">
+                  <a:solidFill>
+                    <a:schemeClr val="bg1"/>
+                  </a:solidFill>
+                </a:endParaRPr>
+              </a:p>
+            </p:txBody>
+          </p:sp>
+        </mc:Choice>
+        <mc:Fallback>
+          <p:sp>
+            <p:nvSpPr>
+              <p:cNvPr id="5" name="TextBox 4"/>
+              <p:cNvSpPr txBox="1">
+                <a:spLocks noRot="1" noChangeAspect="1" noMove="1" noResize="1" noEditPoints="1" noAdjustHandles="1" noChangeArrowheads="1" noChangeShapeType="1" noTextEdit="1"/>
+              </p:cNvSpPr>
+              <p:nvPr/>
+            </p:nvSpPr>
+            <p:spPr>
+              <a:xfrm>
+                <a:off x="6633882" y="3090446"/>
+                <a:ext cx="434799" cy="738664"/>
+              </a:xfrm>
+              <a:prstGeom prst="rect">
+                <a:avLst/>
+              </a:prstGeom>
+              <a:blipFill rotWithShape="0">
+                <a:blip r:embed="rId3"/>
+                <a:stretch>
+                  <a:fillRect/>
+                </a:stretch>
+              </a:blipFill>
+            </p:spPr>
+            <p:txBody>
+              <a:bodyPr/>
+              <a:lstStyle/>
+              <a:p>
+                <a:r>
+                  <a:rPr lang="en-US">
+                    <a:noFill/>
+                  </a:rPr>
+                  <a:t> </a:t>
+                </a:r>
+              </a:p>
+            </p:txBody>
+          </p:sp>
+        </mc:Fallback>
+      </mc:AlternateContent>
+      <mc:AlternateContent xmlns:mc="http://schemas.openxmlformats.org/markup-compatibility/2006">
+        <mc:Choice xmlns:a14="http://schemas.microsoft.com/office/drawing/2010/main" Requires="a14">
+          <p:sp>
+            <p:nvSpPr>
+              <p:cNvPr id="6" name="TextBox 5"/>
+              <p:cNvSpPr txBox="1"/>
+              <p:nvPr/>
+            </p:nvSpPr>
+            <p:spPr>
+              <a:xfrm>
+                <a:off x="8292352" y="2721114"/>
+                <a:ext cx="364908" cy="369332"/>
+              </a:xfrm>
+              <a:prstGeom prst="rect">
+                <a:avLst/>
+              </a:prstGeom>
+              <a:noFill/>
+            </p:spPr>
+            <p:txBody>
+              <a:bodyPr wrap="none" lIns="0" tIns="0" rIns="0" bIns="0" rtlCol="0">
+                <a:spAutoFit/>
+              </a:bodyPr>
+              <a:lstStyle/>
+              <a:p>
+                <a14:m>
+                  <m:oMathPara xmlns:m="http://schemas.openxmlformats.org/officeDocument/2006/math">
+                    <m:oMathParaPr>
+                      <m:jc m:val="centerGroup"/>
+                    </m:oMathParaPr>
+                    <m:oMath xmlns:m="http://schemas.openxmlformats.org/officeDocument/2006/math">
+                      <m:sSub>
+                        <m:sSubPr>
+                          <m:ctrlPr>
+                            <a:rPr lang="en-US" sz="2400" b="0" i="1" smtClean="0">
+                              <a:solidFill>
+                                <a:schemeClr val="bg1"/>
+                              </a:solidFill>
+                              <a:latin typeface="Cambria Math" panose="02040503050406030204" pitchFamily="18" charset="0"/>
+                            </a:rPr>
+                          </m:ctrlPr>
+                        </m:sSubPr>
+                        <m:e>
+                          <m:r>
+                            <a:rPr lang="en-US" sz="2400" b="0" i="1" smtClean="0">
+                              <a:solidFill>
+                                <a:schemeClr val="bg1"/>
+                              </a:solidFill>
+                              <a:latin typeface="Cambria Math" panose="02040503050406030204" pitchFamily="18" charset="0"/>
+                            </a:rPr>
+                            <m:t>𝑥</m:t>
+                          </m:r>
+                        </m:e>
+                        <m:sub>
+                          <m:r>
+                            <a:rPr lang="en-US" sz="2400" b="0" i="1" smtClean="0">
+                              <a:solidFill>
+                                <a:schemeClr val="bg1"/>
+                              </a:solidFill>
+                              <a:latin typeface="Cambria Math" panose="02040503050406030204" pitchFamily="18" charset="0"/>
+                            </a:rPr>
+                            <m:t>1</m:t>
+                          </m:r>
+                        </m:sub>
+                      </m:sSub>
+                    </m:oMath>
+                  </m:oMathPara>
+                </a14:m>
+                <a:endParaRPr lang="en-US" sz="2400" dirty="0">
+                  <a:solidFill>
+                    <a:schemeClr val="bg1"/>
+                  </a:solidFill>
+                </a:endParaRPr>
+              </a:p>
+            </p:txBody>
+          </p:sp>
+        </mc:Choice>
+        <mc:Fallback>
+          <p:sp>
+            <p:nvSpPr>
+              <p:cNvPr id="6" name="TextBox 5"/>
+              <p:cNvSpPr txBox="1">
+                <a:spLocks noRot="1" noChangeAspect="1" noMove="1" noResize="1" noEditPoints="1" noAdjustHandles="1" noChangeArrowheads="1" noChangeShapeType="1" noTextEdit="1"/>
+              </p:cNvSpPr>
+              <p:nvPr/>
+            </p:nvSpPr>
+            <p:spPr>
+              <a:xfrm>
+                <a:off x="8292352" y="2721114"/>
+                <a:ext cx="364908" cy="369332"/>
+              </a:xfrm>
+              <a:prstGeom prst="rect">
+                <a:avLst/>
+              </a:prstGeom>
+              <a:blipFill rotWithShape="0">
+                <a:blip r:embed="rId4"/>
+                <a:stretch>
+                  <a:fillRect l="-10000" r="-8333" b="-13115"/>
+                </a:stretch>
+              </a:blipFill>
+            </p:spPr>
+            <p:txBody>
+              <a:bodyPr/>
+              <a:lstStyle/>
+              <a:p>
+                <a:r>
+                  <a:rPr lang="en-US">
+                    <a:noFill/>
+                  </a:rPr>
+                  <a:t> </a:t>
+                </a:r>
+              </a:p>
+            </p:txBody>
+          </p:sp>
+        </mc:Fallback>
+      </mc:AlternateContent>
+      <mc:AlternateContent xmlns:mc="http://schemas.openxmlformats.org/markup-compatibility/2006">
+        <mc:Choice xmlns:a14="http://schemas.microsoft.com/office/drawing/2010/main" Requires="a14">
+          <p:sp>
+            <p:nvSpPr>
+              <p:cNvPr id="7" name="TextBox 6"/>
+              <p:cNvSpPr txBox="1"/>
+              <p:nvPr/>
+            </p:nvSpPr>
+            <p:spPr>
+              <a:xfrm>
+                <a:off x="5360893" y="1831623"/>
+                <a:ext cx="372025" cy="369332"/>
+              </a:xfrm>
+              <a:prstGeom prst="rect">
+                <a:avLst/>
+              </a:prstGeom>
+              <a:noFill/>
+            </p:spPr>
+            <p:txBody>
+              <a:bodyPr wrap="none" lIns="0" tIns="0" rIns="0" bIns="0" rtlCol="0">
+                <a:spAutoFit/>
+              </a:bodyPr>
+              <a:lstStyle/>
+              <a:p>
+                <a14:m>
+                  <m:oMathPara xmlns:m="http://schemas.openxmlformats.org/officeDocument/2006/math">
+                    <m:oMathParaPr>
+                      <m:jc m:val="centerGroup"/>
+                    </m:oMathParaPr>
+                    <m:oMath xmlns:m="http://schemas.openxmlformats.org/officeDocument/2006/math">
+                      <m:sSub>
+                        <m:sSubPr>
+                          <m:ctrlPr>
+                            <a:rPr lang="en-US" sz="2400" b="0" i="1" smtClean="0">
+                              <a:solidFill>
+                                <a:schemeClr val="bg1"/>
+                              </a:solidFill>
+                              <a:latin typeface="Cambria Math" panose="02040503050406030204" pitchFamily="18" charset="0"/>
+                            </a:rPr>
+                          </m:ctrlPr>
+                        </m:sSubPr>
+                        <m:e>
+                          <m:r>
+                            <a:rPr lang="en-US" sz="2400" b="0" i="1" smtClean="0">
+                              <a:solidFill>
+                                <a:schemeClr val="bg1"/>
+                              </a:solidFill>
+                              <a:latin typeface="Cambria Math" panose="02040503050406030204" pitchFamily="18" charset="0"/>
+                            </a:rPr>
+                            <m:t>𝑥</m:t>
+                          </m:r>
+                        </m:e>
+                        <m:sub>
+                          <m:r>
+                            <a:rPr lang="en-US" sz="2400" b="0" i="1" smtClean="0">
+                              <a:solidFill>
+                                <a:schemeClr val="bg1"/>
+                              </a:solidFill>
+                              <a:latin typeface="Cambria Math" panose="02040503050406030204" pitchFamily="18" charset="0"/>
+                            </a:rPr>
+                            <m:t>4</m:t>
+                          </m:r>
+                        </m:sub>
+                      </m:sSub>
+                    </m:oMath>
+                  </m:oMathPara>
+                </a14:m>
+                <a:endParaRPr lang="en-US" sz="2400" dirty="0">
+                  <a:solidFill>
+                    <a:schemeClr val="bg1"/>
+                  </a:solidFill>
+                </a:endParaRPr>
+              </a:p>
+            </p:txBody>
+          </p:sp>
+        </mc:Choice>
+        <mc:Fallback>
+          <p:sp>
+            <p:nvSpPr>
+              <p:cNvPr id="7" name="TextBox 6"/>
+              <p:cNvSpPr txBox="1">
+                <a:spLocks noRot="1" noChangeAspect="1" noMove="1" noResize="1" noEditPoints="1" noAdjustHandles="1" noChangeArrowheads="1" noChangeShapeType="1" noTextEdit="1"/>
+              </p:cNvSpPr>
+              <p:nvPr/>
+            </p:nvSpPr>
+            <p:spPr>
+              <a:xfrm>
+                <a:off x="5360893" y="1831623"/>
+                <a:ext cx="372025" cy="369332"/>
+              </a:xfrm>
+              <a:prstGeom prst="rect">
+                <a:avLst/>
+              </a:prstGeom>
+              <a:blipFill rotWithShape="0">
+                <a:blip r:embed="rId5"/>
+                <a:stretch>
+                  <a:fillRect l="-9836" r="-8197" b="-13115"/>
+                </a:stretch>
+              </a:blipFill>
+            </p:spPr>
+            <p:txBody>
+              <a:bodyPr/>
+              <a:lstStyle/>
+              <a:p>
+                <a:r>
+                  <a:rPr lang="en-US">
+                    <a:noFill/>
+                  </a:rPr>
+                  <a:t> </a:t>
+                </a:r>
+              </a:p>
+            </p:txBody>
+          </p:sp>
+        </mc:Fallback>
+      </mc:AlternateContent>
+      <mc:AlternateContent xmlns:mc="http://schemas.openxmlformats.org/markup-compatibility/2006">
+        <mc:Choice xmlns:a14="http://schemas.microsoft.com/office/drawing/2010/main" Requires="a14">
+          <p:sp>
+            <p:nvSpPr>
+              <p:cNvPr id="8" name="TextBox 7"/>
+              <p:cNvSpPr txBox="1"/>
+              <p:nvPr/>
+            </p:nvSpPr>
+            <p:spPr>
+              <a:xfrm>
+                <a:off x="4769222" y="3931349"/>
+                <a:ext cx="372025" cy="369332"/>
+              </a:xfrm>
+              <a:prstGeom prst="rect">
+                <a:avLst/>
+              </a:prstGeom>
+              <a:noFill/>
+            </p:spPr>
+            <p:txBody>
+              <a:bodyPr wrap="none" lIns="0" tIns="0" rIns="0" bIns="0" rtlCol="0">
+                <a:spAutoFit/>
+              </a:bodyPr>
+              <a:lstStyle/>
+              <a:p>
+                <a14:m>
+                  <m:oMathPara xmlns:m="http://schemas.openxmlformats.org/officeDocument/2006/math">
+                    <m:oMathParaPr>
+                      <m:jc m:val="centerGroup"/>
+                    </m:oMathParaPr>
+                    <m:oMath xmlns:m="http://schemas.openxmlformats.org/officeDocument/2006/math">
+                      <m:sSub>
+                        <m:sSubPr>
+                          <m:ctrlPr>
+                            <a:rPr lang="en-US" sz="2400" b="0" i="1" smtClean="0">
+                              <a:solidFill>
+                                <a:schemeClr val="bg1"/>
+                              </a:solidFill>
+                              <a:latin typeface="Cambria Math" panose="02040503050406030204" pitchFamily="18" charset="0"/>
+                            </a:rPr>
+                          </m:ctrlPr>
+                        </m:sSubPr>
+                        <m:e>
+                          <m:r>
+                            <a:rPr lang="en-US" sz="2400" b="0" i="1" smtClean="0">
+                              <a:solidFill>
+                                <a:schemeClr val="bg1"/>
+                              </a:solidFill>
+                              <a:latin typeface="Cambria Math" panose="02040503050406030204" pitchFamily="18" charset="0"/>
+                            </a:rPr>
+                            <m:t>𝑥</m:t>
+                          </m:r>
+                        </m:e>
+                        <m:sub>
+                          <m:r>
+                            <a:rPr lang="en-US" sz="2400" b="0" i="1" smtClean="0">
+                              <a:solidFill>
+                                <a:schemeClr val="bg1"/>
+                              </a:solidFill>
+                              <a:latin typeface="Cambria Math" panose="02040503050406030204" pitchFamily="18" charset="0"/>
+                            </a:rPr>
+                            <m:t>3</m:t>
+                          </m:r>
+                        </m:sub>
+                      </m:sSub>
+                    </m:oMath>
+                  </m:oMathPara>
+                </a14:m>
+                <a:endParaRPr lang="en-US" sz="2400" dirty="0">
+                  <a:solidFill>
+                    <a:schemeClr val="bg1"/>
+                  </a:solidFill>
+                </a:endParaRPr>
+              </a:p>
+            </p:txBody>
+          </p:sp>
+        </mc:Choice>
+        <mc:Fallback>
+          <p:sp>
+            <p:nvSpPr>
+              <p:cNvPr id="8" name="TextBox 7"/>
+              <p:cNvSpPr txBox="1">
+                <a:spLocks noRot="1" noChangeAspect="1" noMove="1" noResize="1" noEditPoints="1" noAdjustHandles="1" noChangeArrowheads="1" noChangeShapeType="1" noTextEdit="1"/>
+              </p:cNvSpPr>
+              <p:nvPr/>
+            </p:nvSpPr>
+            <p:spPr>
+              <a:xfrm>
+                <a:off x="4769222" y="3931349"/>
+                <a:ext cx="372025" cy="369332"/>
+              </a:xfrm>
+              <a:prstGeom prst="rect">
+                <a:avLst/>
+              </a:prstGeom>
+              <a:blipFill rotWithShape="0">
+                <a:blip r:embed="rId6"/>
+                <a:stretch>
+                  <a:fillRect l="-9836" r="-8197" b="-15000"/>
+                </a:stretch>
+              </a:blipFill>
+            </p:spPr>
+            <p:txBody>
+              <a:bodyPr/>
+              <a:lstStyle/>
+              <a:p>
+                <a:r>
+                  <a:rPr lang="en-US">
+                    <a:noFill/>
+                  </a:rPr>
+                  <a:t> </a:t>
+                </a:r>
+              </a:p>
+            </p:txBody>
+          </p:sp>
+        </mc:Fallback>
+      </mc:AlternateContent>
+      <mc:AlternateContent xmlns:mc="http://schemas.openxmlformats.org/markup-compatibility/2006">
+        <mc:Choice xmlns:a14="http://schemas.microsoft.com/office/drawing/2010/main" Requires="a14">
+          <p:sp>
+            <p:nvSpPr>
+              <p:cNvPr id="9" name="TextBox 8"/>
+              <p:cNvSpPr txBox="1"/>
+              <p:nvPr/>
+            </p:nvSpPr>
+            <p:spPr>
+              <a:xfrm>
+                <a:off x="7083466" y="4182361"/>
+                <a:ext cx="372025" cy="369332"/>
+              </a:xfrm>
+              <a:prstGeom prst="rect">
+                <a:avLst/>
+              </a:prstGeom>
+              <a:noFill/>
+            </p:spPr>
+            <p:txBody>
+              <a:bodyPr wrap="none" lIns="0" tIns="0" rIns="0" bIns="0" rtlCol="0">
+                <a:spAutoFit/>
+              </a:bodyPr>
+              <a:lstStyle/>
+              <a:p>
+                <a14:m>
+                  <m:oMathPara xmlns:m="http://schemas.openxmlformats.org/officeDocument/2006/math">
+                    <m:oMathParaPr>
+                      <m:jc m:val="centerGroup"/>
+                    </m:oMathParaPr>
+                    <m:oMath xmlns:m="http://schemas.openxmlformats.org/officeDocument/2006/math">
+                      <m:sSub>
+                        <m:sSubPr>
+                          <m:ctrlPr>
+                            <a:rPr lang="en-US" sz="2400" b="0" i="1" smtClean="0">
+                              <a:solidFill>
+                                <a:schemeClr val="bg1"/>
+                              </a:solidFill>
+                              <a:latin typeface="Cambria Math" panose="02040503050406030204" pitchFamily="18" charset="0"/>
+                            </a:rPr>
+                          </m:ctrlPr>
+                        </m:sSubPr>
+                        <m:e>
+                          <m:r>
+                            <a:rPr lang="en-US" sz="2400" b="0" i="1" smtClean="0">
+                              <a:solidFill>
+                                <a:schemeClr val="bg1"/>
+                              </a:solidFill>
+                              <a:latin typeface="Cambria Math" panose="02040503050406030204" pitchFamily="18" charset="0"/>
+                            </a:rPr>
+                            <m:t>𝑥</m:t>
+                          </m:r>
+                        </m:e>
+                        <m:sub>
+                          <m:r>
+                            <a:rPr lang="en-US" sz="2400" b="0" i="1" smtClean="0">
+                              <a:solidFill>
+                                <a:schemeClr val="bg1"/>
+                              </a:solidFill>
+                              <a:latin typeface="Cambria Math" panose="02040503050406030204" pitchFamily="18" charset="0"/>
+                            </a:rPr>
+                            <m:t>2</m:t>
+                          </m:r>
+                        </m:sub>
+                      </m:sSub>
+                    </m:oMath>
+                  </m:oMathPara>
+                </a14:m>
+                <a:endParaRPr lang="en-US" sz="2400" dirty="0">
+                  <a:solidFill>
+                    <a:schemeClr val="bg1"/>
+                  </a:solidFill>
+                </a:endParaRPr>
+              </a:p>
+            </p:txBody>
+          </p:sp>
+        </mc:Choice>
+        <mc:Fallback>
+          <p:sp>
+            <p:nvSpPr>
+              <p:cNvPr id="9" name="TextBox 8"/>
+              <p:cNvSpPr txBox="1">
+                <a:spLocks noRot="1" noChangeAspect="1" noMove="1" noResize="1" noEditPoints="1" noAdjustHandles="1" noChangeArrowheads="1" noChangeShapeType="1" noTextEdit="1"/>
+              </p:cNvSpPr>
+              <p:nvPr/>
+            </p:nvSpPr>
+            <p:spPr>
+              <a:xfrm>
+                <a:off x="7083466" y="4182361"/>
+                <a:ext cx="372025" cy="369332"/>
+              </a:xfrm>
+              <a:prstGeom prst="rect">
+                <a:avLst/>
+              </a:prstGeom>
+              <a:blipFill rotWithShape="0">
+                <a:blip r:embed="rId7"/>
+                <a:stretch>
+                  <a:fillRect l="-11475" r="-8197" b="-13115"/>
+                </a:stretch>
+              </a:blipFill>
+            </p:spPr>
+            <p:txBody>
+              <a:bodyPr/>
+              <a:lstStyle/>
+              <a:p>
+                <a:r>
+                  <a:rPr lang="en-US">
+                    <a:noFill/>
+                  </a:rPr>
+                  <a:t> </a:t>
+                </a:r>
+              </a:p>
+            </p:txBody>
+          </p:sp>
+        </mc:Fallback>
+      </mc:AlternateContent>
+    </p:spTree>
+    <p:extLst>
+      <p:ext uri="{BB962C8B-B14F-4D97-AF65-F5344CB8AC3E}">
+        <p14:creationId xmlns:p14="http://schemas.microsoft.com/office/powerpoint/2010/main" val="3698669139"/>
+      </p:ext>
+    </p:extLst>
+  </p:cSld>
+  <p:clrMapOvr>
+    <a:masterClrMapping/>
+  </p:clrMapOvr>
+</p:sld>
+</file>
+
 <file path=ppt/theme/theme1.xml><?xml version="1.0" encoding="utf-8"?>
 <a:theme xmlns:a="http://schemas.openxmlformats.org/drawingml/2006/main" name="Office Theme">
   <a:themeElements>

</xml_diff>